<commit_message>
v3.5: add feature: adding caption to each chapter
</commit_message>
<xml_diff>
--- a/test.pptx
+++ b/test.pptx
@@ -264,7 +264,7 @@
           <a:p>
             <a:fld id="{1C81B26C-6263-4E12-89DE-36E2C44E937F}" type="datetimeFigureOut">
               <a:rPr lang="zh-CN" altLang="en-US" smtClean="0"/>
-              <a:t>2023/4/23</a:t>
+              <a:t>2023/4/25</a:t>
             </a:fld>
             <a:endParaRPr lang="zh-CN" altLang="en-US"/>
           </a:p>
@@ -434,7 +434,7 @@
           <a:p>
             <a:fld id="{1C81B26C-6263-4E12-89DE-36E2C44E937F}" type="datetimeFigureOut">
               <a:rPr lang="zh-CN" altLang="en-US" smtClean="0"/>
-              <a:t>2023/4/23</a:t>
+              <a:t>2023/4/25</a:t>
             </a:fld>
             <a:endParaRPr lang="zh-CN" altLang="en-US"/>
           </a:p>
@@ -614,7 +614,7 @@
           <a:p>
             <a:fld id="{1C81B26C-6263-4E12-89DE-36E2C44E937F}" type="datetimeFigureOut">
               <a:rPr lang="zh-CN" altLang="en-US" smtClean="0"/>
-              <a:t>2023/4/23</a:t>
+              <a:t>2023/4/25</a:t>
             </a:fld>
             <a:endParaRPr lang="zh-CN" altLang="en-US"/>
           </a:p>
@@ -784,7 +784,7 @@
           <a:p>
             <a:fld id="{1C81B26C-6263-4E12-89DE-36E2C44E937F}" type="datetimeFigureOut">
               <a:rPr lang="zh-CN" altLang="en-US" smtClean="0"/>
-              <a:t>2023/4/23</a:t>
+              <a:t>2023/4/25</a:t>
             </a:fld>
             <a:endParaRPr lang="zh-CN" altLang="en-US"/>
           </a:p>
@@ -1030,7 +1030,7 @@
           <a:p>
             <a:fld id="{1C81B26C-6263-4E12-89DE-36E2C44E937F}" type="datetimeFigureOut">
               <a:rPr lang="zh-CN" altLang="en-US" smtClean="0"/>
-              <a:t>2023/4/23</a:t>
+              <a:t>2023/4/25</a:t>
             </a:fld>
             <a:endParaRPr lang="zh-CN" altLang="en-US"/>
           </a:p>
@@ -1262,7 +1262,7 @@
           <a:p>
             <a:fld id="{1C81B26C-6263-4E12-89DE-36E2C44E937F}" type="datetimeFigureOut">
               <a:rPr lang="zh-CN" altLang="en-US" smtClean="0"/>
-              <a:t>2023/4/23</a:t>
+              <a:t>2023/4/25</a:t>
             </a:fld>
             <a:endParaRPr lang="zh-CN" altLang="en-US"/>
           </a:p>
@@ -1629,7 +1629,7 @@
           <a:p>
             <a:fld id="{1C81B26C-6263-4E12-89DE-36E2C44E937F}" type="datetimeFigureOut">
               <a:rPr lang="zh-CN" altLang="en-US" smtClean="0"/>
-              <a:t>2023/4/23</a:t>
+              <a:t>2023/4/25</a:t>
             </a:fld>
             <a:endParaRPr lang="zh-CN" altLang="en-US"/>
           </a:p>
@@ -1747,7 +1747,7 @@
           <a:p>
             <a:fld id="{1C81B26C-6263-4E12-89DE-36E2C44E937F}" type="datetimeFigureOut">
               <a:rPr lang="zh-CN" altLang="en-US" smtClean="0"/>
-              <a:t>2023/4/23</a:t>
+              <a:t>2023/4/25</a:t>
             </a:fld>
             <a:endParaRPr lang="zh-CN" altLang="en-US"/>
           </a:p>
@@ -1842,7 +1842,7 @@
           <a:p>
             <a:fld id="{1C81B26C-6263-4E12-89DE-36E2C44E937F}" type="datetimeFigureOut">
               <a:rPr lang="zh-CN" altLang="en-US" smtClean="0"/>
-              <a:t>2023/4/23</a:t>
+              <a:t>2023/4/25</a:t>
             </a:fld>
             <a:endParaRPr lang="zh-CN" altLang="en-US"/>
           </a:p>
@@ -2119,7 +2119,7 @@
           <a:p>
             <a:fld id="{1C81B26C-6263-4E12-89DE-36E2C44E937F}" type="datetimeFigureOut">
               <a:rPr lang="zh-CN" altLang="en-US" smtClean="0"/>
-              <a:t>2023/4/23</a:t>
+              <a:t>2023/4/25</a:t>
             </a:fld>
             <a:endParaRPr lang="zh-CN" altLang="en-US"/>
           </a:p>
@@ -2372,7 +2372,7 @@
           <a:p>
             <a:fld id="{1C81B26C-6263-4E12-89DE-36E2C44E937F}" type="datetimeFigureOut">
               <a:rPr lang="zh-CN" altLang="en-US" smtClean="0"/>
-              <a:t>2023/4/23</a:t>
+              <a:t>2023/4/25</a:t>
             </a:fld>
             <a:endParaRPr lang="zh-CN" altLang="en-US"/>
           </a:p>
@@ -2585,7 +2585,7 @@
           <a:p>
             <a:fld id="{1C81B26C-6263-4E12-89DE-36E2C44E937F}" type="datetimeFigureOut">
               <a:rPr lang="zh-CN" altLang="en-US" smtClean="0"/>
-              <a:t>2023/4/23</a:t>
+              <a:t>2023/4/25</a:t>
             </a:fld>
             <a:endParaRPr lang="zh-CN" altLang="en-US"/>
           </a:p>
@@ -3040,10 +3040,10 @@
         </p:nvGrpSpPr>
         <p:grpSpPr>
           <a:xfrm>
-            <a:off x="0" y="6629400"/>
-            <a:ext cx="12191999" cy="228600"/>
-            <a:chOff x="0" y="6629400"/>
-            <a:chExt cx="12191999" cy="228600"/>
+            <a:off x="0" y="6400800"/>
+            <a:ext cx="12191999" cy="457200"/>
+            <a:chOff x="0" y="6400800"/>
+            <a:chExt cx="12191999" cy="457200"/>
           </a:xfrm>
         </p:grpSpPr>
         <p:sp>
@@ -3091,7 +3091,35 @@
         </p:sp>
         <p:sp>
           <p:nvSpPr>
-            <p:cNvPr id="6" name="Rectangle 5"/>
+            <p:cNvPr id="6" name="TextBox 5"/>
+            <p:cNvSpPr txBox="1"/>
+            <p:nvPr/>
+          </p:nvSpPr>
+          <p:spPr>
+            <a:xfrm>
+              <a:off x="0" y="6400800"/>
+              <a:ext cx="554181" cy="228600"/>
+            </a:xfrm>
+            <a:prstGeom prst="rect">
+              <a:avLst/>
+            </a:prstGeom>
+            <a:noFill/>
+          </p:spPr>
+          <p:txBody>
+            <a:bodyPr wrap="none">
+              <a:spAutoFit/>
+            </a:bodyPr>
+            <a:lstStyle/>
+            <a:p>
+              <a:pPr>
+                <a:defRPr sz="1200"/>
+              </a:pPr>
+            </a:p>
+          </p:txBody>
+        </p:sp>
+        <p:sp>
+          <p:nvSpPr>
+            <p:cNvPr id="7" name="Rectangle 6"/>
             <p:cNvSpPr/>
             <p:nvPr/>
           </p:nvSpPr>
@@ -3209,10 +3237,10 @@
         </p:nvGrpSpPr>
         <p:grpSpPr>
           <a:xfrm>
-            <a:off x="0" y="6629400"/>
-            <a:ext cx="12191999" cy="228600"/>
-            <a:chOff x="0" y="6629400"/>
-            <a:chExt cx="12191999" cy="228600"/>
+            <a:off x="0" y="6400800"/>
+            <a:ext cx="12191999" cy="457200"/>
+            <a:chOff x="0" y="6400800"/>
+            <a:chExt cx="12191999" cy="457200"/>
           </a:xfrm>
         </p:grpSpPr>
         <p:sp>
@@ -3260,7 +3288,35 @@
         </p:sp>
         <p:sp>
           <p:nvSpPr>
-            <p:cNvPr id="6" name="Rectangle 5"/>
+            <p:cNvPr id="6" name="TextBox 5"/>
+            <p:cNvSpPr txBox="1"/>
+            <p:nvPr/>
+          </p:nvSpPr>
+          <p:spPr>
+            <a:xfrm>
+              <a:off x="0" y="6400800"/>
+              <a:ext cx="1108363" cy="228600"/>
+            </a:xfrm>
+            <a:prstGeom prst="rect">
+              <a:avLst/>
+            </a:prstGeom>
+            <a:noFill/>
+          </p:spPr>
+          <p:txBody>
+            <a:bodyPr wrap="none">
+              <a:spAutoFit/>
+            </a:bodyPr>
+            <a:lstStyle/>
+            <a:p>
+              <a:pPr>
+                <a:defRPr sz="1200"/>
+              </a:pPr>
+            </a:p>
+          </p:txBody>
+        </p:sp>
+        <p:sp>
+          <p:nvSpPr>
+            <p:cNvPr id="7" name="Rectangle 6"/>
             <p:cNvSpPr/>
             <p:nvPr/>
           </p:nvSpPr>
@@ -3303,7 +3359,38 @@
         </p:sp>
         <p:sp>
           <p:nvSpPr>
-            <p:cNvPr id="7" name="Rectangle 6"/>
+            <p:cNvPr id="8" name="TextBox 7"/>
+            <p:cNvSpPr txBox="1"/>
+            <p:nvPr/>
+          </p:nvSpPr>
+          <p:spPr>
+            <a:xfrm>
+              <a:off x="1108363" y="6400800"/>
+              <a:ext cx="1662545" cy="228600"/>
+            </a:xfrm>
+            <a:prstGeom prst="rect">
+              <a:avLst/>
+            </a:prstGeom>
+            <a:noFill/>
+          </p:spPr>
+          <p:txBody>
+            <a:bodyPr wrap="none">
+              <a:spAutoFit/>
+            </a:bodyPr>
+            <a:lstStyle/>
+            <a:p>
+              <a:pPr>
+                <a:defRPr sz="1200"/>
+              </a:pPr>
+              <a:r>
+                <a:t>chapter1</a:t>
+              </a:r>
+            </a:p>
+          </p:txBody>
+        </p:sp>
+        <p:sp>
+          <p:nvSpPr>
+            <p:cNvPr id="9" name="Rectangle 8"/>
             <p:cNvSpPr/>
             <p:nvPr/>
           </p:nvSpPr>
@@ -3346,7 +3433,38 @@
         </p:sp>
         <p:sp>
           <p:nvSpPr>
-            <p:cNvPr id="8" name="Rectangle 7"/>
+            <p:cNvPr id="10" name="TextBox 9"/>
+            <p:cNvSpPr txBox="1"/>
+            <p:nvPr/>
+          </p:nvSpPr>
+          <p:spPr>
+            <a:xfrm>
+              <a:off x="2770909" y="6400800"/>
+              <a:ext cx="2770909" cy="228600"/>
+            </a:xfrm>
+            <a:prstGeom prst="rect">
+              <a:avLst/>
+            </a:prstGeom>
+            <a:noFill/>
+          </p:spPr>
+          <p:txBody>
+            <a:bodyPr wrap="none">
+              <a:spAutoFit/>
+            </a:bodyPr>
+            <a:lstStyle/>
+            <a:p>
+              <a:pPr>
+                <a:defRPr sz="1200"/>
+              </a:pPr>
+              <a:r>
+                <a:t>chapter2</a:t>
+              </a:r>
+            </a:p>
+          </p:txBody>
+        </p:sp>
+        <p:sp>
+          <p:nvSpPr>
+            <p:cNvPr id="11" name="Rectangle 10"/>
             <p:cNvSpPr/>
             <p:nvPr/>
           </p:nvSpPr>
@@ -3468,10 +3586,10 @@
         </p:nvGrpSpPr>
         <p:grpSpPr>
           <a:xfrm>
-            <a:off x="0" y="6629400"/>
-            <a:ext cx="12192000" cy="228600"/>
-            <a:chOff x="0" y="6629400"/>
-            <a:chExt cx="12192000" cy="228600"/>
+            <a:off x="0" y="6400800"/>
+            <a:ext cx="12192000" cy="457200"/>
+            <a:chOff x="0" y="6400800"/>
+            <a:chExt cx="12192000" cy="457200"/>
           </a:xfrm>
         </p:grpSpPr>
         <p:sp>
@@ -3519,7 +3637,35 @@
         </p:sp>
         <p:sp>
           <p:nvSpPr>
-            <p:cNvPr id="7" name="Rectangle 6"/>
+            <p:cNvPr id="7" name="TextBox 6"/>
+            <p:cNvSpPr txBox="1"/>
+            <p:nvPr/>
+          </p:nvSpPr>
+          <p:spPr>
+            <a:xfrm>
+              <a:off x="0" y="6400800"/>
+              <a:ext cx="1108363" cy="228600"/>
+            </a:xfrm>
+            <a:prstGeom prst="rect">
+              <a:avLst/>
+            </a:prstGeom>
+            <a:noFill/>
+          </p:spPr>
+          <p:txBody>
+            <a:bodyPr wrap="none">
+              <a:spAutoFit/>
+            </a:bodyPr>
+            <a:lstStyle/>
+            <a:p>
+              <a:pPr>
+                <a:defRPr sz="1200"/>
+              </a:pPr>
+            </a:p>
+          </p:txBody>
+        </p:sp>
+        <p:sp>
+          <p:nvSpPr>
+            <p:cNvPr id="8" name="Rectangle 7"/>
             <p:cNvSpPr/>
             <p:nvPr/>
           </p:nvSpPr>
@@ -3562,7 +3708,38 @@
         </p:sp>
         <p:sp>
           <p:nvSpPr>
-            <p:cNvPr id="8" name="Rectangle 7"/>
+            <p:cNvPr id="9" name="TextBox 8"/>
+            <p:cNvSpPr txBox="1"/>
+            <p:nvPr/>
+          </p:nvSpPr>
+          <p:spPr>
+            <a:xfrm>
+              <a:off x="1108363" y="6400800"/>
+              <a:ext cx="1662545" cy="228600"/>
+            </a:xfrm>
+            <a:prstGeom prst="rect">
+              <a:avLst/>
+            </a:prstGeom>
+            <a:noFill/>
+          </p:spPr>
+          <p:txBody>
+            <a:bodyPr wrap="none">
+              <a:spAutoFit/>
+            </a:bodyPr>
+            <a:lstStyle/>
+            <a:p>
+              <a:pPr>
+                <a:defRPr sz="1200"/>
+              </a:pPr>
+              <a:r>
+                <a:t>chapter1</a:t>
+              </a:r>
+            </a:p>
+          </p:txBody>
+        </p:sp>
+        <p:sp>
+          <p:nvSpPr>
+            <p:cNvPr id="10" name="Rectangle 9"/>
             <p:cNvSpPr/>
             <p:nvPr/>
           </p:nvSpPr>
@@ -3605,7 +3782,38 @@
         </p:sp>
         <p:sp>
           <p:nvSpPr>
-            <p:cNvPr id="9" name="Rectangle 8"/>
+            <p:cNvPr id="11" name="TextBox 10"/>
+            <p:cNvSpPr txBox="1"/>
+            <p:nvPr/>
+          </p:nvSpPr>
+          <p:spPr>
+            <a:xfrm>
+              <a:off x="2770909" y="6400800"/>
+              <a:ext cx="2770909" cy="228600"/>
+            </a:xfrm>
+            <a:prstGeom prst="rect">
+              <a:avLst/>
+            </a:prstGeom>
+            <a:noFill/>
+          </p:spPr>
+          <p:txBody>
+            <a:bodyPr wrap="none">
+              <a:spAutoFit/>
+            </a:bodyPr>
+            <a:lstStyle/>
+            <a:p>
+              <a:pPr>
+                <a:defRPr sz="1200"/>
+              </a:pPr>
+              <a:r>
+                <a:t>chapter2</a:t>
+              </a:r>
+            </a:p>
+          </p:txBody>
+        </p:sp>
+        <p:sp>
+          <p:nvSpPr>
+            <p:cNvPr id="12" name="Rectangle 11"/>
             <p:cNvSpPr/>
             <p:nvPr/>
           </p:nvSpPr>
@@ -3648,7 +3856,38 @@
         </p:sp>
         <p:sp>
           <p:nvSpPr>
-            <p:cNvPr id="10" name="Rectangle 9"/>
+            <p:cNvPr id="13" name="TextBox 12"/>
+            <p:cNvSpPr txBox="1"/>
+            <p:nvPr/>
+          </p:nvSpPr>
+          <p:spPr>
+            <a:xfrm>
+              <a:off x="5541818" y="6400800"/>
+              <a:ext cx="554181" cy="228600"/>
+            </a:xfrm>
+            <a:prstGeom prst="rect">
+              <a:avLst/>
+            </a:prstGeom>
+            <a:noFill/>
+          </p:spPr>
+          <p:txBody>
+            <a:bodyPr wrap="none">
+              <a:spAutoFit/>
+            </a:bodyPr>
+            <a:lstStyle/>
+            <a:p>
+              <a:pPr>
+                <a:defRPr sz="1200"/>
+              </a:pPr>
+              <a:r>
+                <a:t>chapter3</a:t>
+              </a:r>
+            </a:p>
+          </p:txBody>
+        </p:sp>
+        <p:sp>
+          <p:nvSpPr>
+            <p:cNvPr id="14" name="Rectangle 13"/>
             <p:cNvSpPr/>
             <p:nvPr/>
           </p:nvSpPr>
@@ -3766,10 +4005,10 @@
         </p:nvGrpSpPr>
         <p:grpSpPr>
           <a:xfrm>
-            <a:off x="0" y="6629400"/>
-            <a:ext cx="12191999" cy="228600"/>
-            <a:chOff x="0" y="6629400"/>
-            <a:chExt cx="12191999" cy="228600"/>
+            <a:off x="0" y="6400800"/>
+            <a:ext cx="12191999" cy="457200"/>
+            <a:chOff x="0" y="6400800"/>
+            <a:chExt cx="12191999" cy="457200"/>
           </a:xfrm>
         </p:grpSpPr>
         <p:sp>
@@ -3817,7 +4056,35 @@
         </p:sp>
         <p:sp>
           <p:nvSpPr>
-            <p:cNvPr id="6" name="Rectangle 5"/>
+            <p:cNvPr id="6" name="TextBox 5"/>
+            <p:cNvSpPr txBox="1"/>
+            <p:nvPr/>
+          </p:nvSpPr>
+          <p:spPr>
+            <a:xfrm>
+              <a:off x="0" y="6400800"/>
+              <a:ext cx="1108363" cy="228600"/>
+            </a:xfrm>
+            <a:prstGeom prst="rect">
+              <a:avLst/>
+            </a:prstGeom>
+            <a:noFill/>
+          </p:spPr>
+          <p:txBody>
+            <a:bodyPr wrap="none">
+              <a:spAutoFit/>
+            </a:bodyPr>
+            <a:lstStyle/>
+            <a:p>
+              <a:pPr>
+                <a:defRPr sz="1200"/>
+              </a:pPr>
+            </a:p>
+          </p:txBody>
+        </p:sp>
+        <p:sp>
+          <p:nvSpPr>
+            <p:cNvPr id="7" name="Rectangle 6"/>
             <p:cNvSpPr/>
             <p:nvPr/>
           </p:nvSpPr>
@@ -3860,7 +4127,38 @@
         </p:sp>
         <p:sp>
           <p:nvSpPr>
-            <p:cNvPr id="7" name="Rectangle 6"/>
+            <p:cNvPr id="8" name="TextBox 7"/>
+            <p:cNvSpPr txBox="1"/>
+            <p:nvPr/>
+          </p:nvSpPr>
+          <p:spPr>
+            <a:xfrm>
+              <a:off x="1108363" y="6400800"/>
+              <a:ext cx="1662545" cy="228600"/>
+            </a:xfrm>
+            <a:prstGeom prst="rect">
+              <a:avLst/>
+            </a:prstGeom>
+            <a:noFill/>
+          </p:spPr>
+          <p:txBody>
+            <a:bodyPr wrap="none">
+              <a:spAutoFit/>
+            </a:bodyPr>
+            <a:lstStyle/>
+            <a:p>
+              <a:pPr>
+                <a:defRPr sz="1200"/>
+              </a:pPr>
+              <a:r>
+                <a:t>chapter1</a:t>
+              </a:r>
+            </a:p>
+          </p:txBody>
+        </p:sp>
+        <p:sp>
+          <p:nvSpPr>
+            <p:cNvPr id="9" name="Rectangle 8"/>
             <p:cNvSpPr/>
             <p:nvPr/>
           </p:nvSpPr>
@@ -3903,7 +4201,38 @@
         </p:sp>
         <p:sp>
           <p:nvSpPr>
-            <p:cNvPr id="8" name="Rectangle 7"/>
+            <p:cNvPr id="10" name="TextBox 9"/>
+            <p:cNvSpPr txBox="1"/>
+            <p:nvPr/>
+          </p:nvSpPr>
+          <p:spPr>
+            <a:xfrm>
+              <a:off x="2770909" y="6400800"/>
+              <a:ext cx="2770909" cy="228600"/>
+            </a:xfrm>
+            <a:prstGeom prst="rect">
+              <a:avLst/>
+            </a:prstGeom>
+            <a:noFill/>
+          </p:spPr>
+          <p:txBody>
+            <a:bodyPr wrap="none">
+              <a:spAutoFit/>
+            </a:bodyPr>
+            <a:lstStyle/>
+            <a:p>
+              <a:pPr>
+                <a:defRPr sz="1200"/>
+              </a:pPr>
+              <a:r>
+                <a:t>chapter2</a:t>
+              </a:r>
+            </a:p>
+          </p:txBody>
+        </p:sp>
+        <p:sp>
+          <p:nvSpPr>
+            <p:cNvPr id="11" name="Rectangle 10"/>
             <p:cNvSpPr/>
             <p:nvPr/>
           </p:nvSpPr>
@@ -3946,7 +4275,38 @@
         </p:sp>
         <p:sp>
           <p:nvSpPr>
-            <p:cNvPr id="9" name="Rectangle 8"/>
+            <p:cNvPr id="12" name="TextBox 11"/>
+            <p:cNvSpPr txBox="1"/>
+            <p:nvPr/>
+          </p:nvSpPr>
+          <p:spPr>
+            <a:xfrm>
+              <a:off x="5541818" y="6400800"/>
+              <a:ext cx="1108363" cy="228600"/>
+            </a:xfrm>
+            <a:prstGeom prst="rect">
+              <a:avLst/>
+            </a:prstGeom>
+            <a:noFill/>
+          </p:spPr>
+          <p:txBody>
+            <a:bodyPr wrap="none">
+              <a:spAutoFit/>
+            </a:bodyPr>
+            <a:lstStyle/>
+            <a:p>
+              <a:pPr>
+                <a:defRPr sz="1200"/>
+              </a:pPr>
+              <a:r>
+                <a:t>chapter3</a:t>
+              </a:r>
+            </a:p>
+          </p:txBody>
+        </p:sp>
+        <p:sp>
+          <p:nvSpPr>
+            <p:cNvPr id="13" name="Rectangle 12"/>
             <p:cNvSpPr/>
             <p:nvPr/>
           </p:nvSpPr>
@@ -4064,10 +4424,10 @@
         </p:nvGrpSpPr>
         <p:grpSpPr>
           <a:xfrm>
-            <a:off x="0" y="6629400"/>
-            <a:ext cx="12191999" cy="228600"/>
-            <a:chOff x="0" y="6629400"/>
-            <a:chExt cx="12191999" cy="228600"/>
+            <a:off x="0" y="6400800"/>
+            <a:ext cx="12191999" cy="457200"/>
+            <a:chOff x="0" y="6400800"/>
+            <a:chExt cx="12191999" cy="457200"/>
           </a:xfrm>
         </p:grpSpPr>
         <p:sp>
@@ -4115,7 +4475,35 @@
         </p:sp>
         <p:sp>
           <p:nvSpPr>
-            <p:cNvPr id="6" name="Rectangle 5"/>
+            <p:cNvPr id="6" name="TextBox 5"/>
+            <p:cNvSpPr txBox="1"/>
+            <p:nvPr/>
+          </p:nvSpPr>
+          <p:spPr>
+            <a:xfrm>
+              <a:off x="0" y="6400800"/>
+              <a:ext cx="1108363" cy="228600"/>
+            </a:xfrm>
+            <a:prstGeom prst="rect">
+              <a:avLst/>
+            </a:prstGeom>
+            <a:noFill/>
+          </p:spPr>
+          <p:txBody>
+            <a:bodyPr wrap="none">
+              <a:spAutoFit/>
+            </a:bodyPr>
+            <a:lstStyle/>
+            <a:p>
+              <a:pPr>
+                <a:defRPr sz="1200"/>
+              </a:pPr>
+            </a:p>
+          </p:txBody>
+        </p:sp>
+        <p:sp>
+          <p:nvSpPr>
+            <p:cNvPr id="7" name="Rectangle 6"/>
             <p:cNvSpPr/>
             <p:nvPr/>
           </p:nvSpPr>
@@ -4158,7 +4546,38 @@
         </p:sp>
         <p:sp>
           <p:nvSpPr>
-            <p:cNvPr id="7" name="Rectangle 6"/>
+            <p:cNvPr id="8" name="TextBox 7"/>
+            <p:cNvSpPr txBox="1"/>
+            <p:nvPr/>
+          </p:nvSpPr>
+          <p:spPr>
+            <a:xfrm>
+              <a:off x="1108363" y="6400800"/>
+              <a:ext cx="1662545" cy="228600"/>
+            </a:xfrm>
+            <a:prstGeom prst="rect">
+              <a:avLst/>
+            </a:prstGeom>
+            <a:noFill/>
+          </p:spPr>
+          <p:txBody>
+            <a:bodyPr wrap="none">
+              <a:spAutoFit/>
+            </a:bodyPr>
+            <a:lstStyle/>
+            <a:p>
+              <a:pPr>
+                <a:defRPr sz="1200"/>
+              </a:pPr>
+              <a:r>
+                <a:t>chapter1</a:t>
+              </a:r>
+            </a:p>
+          </p:txBody>
+        </p:sp>
+        <p:sp>
+          <p:nvSpPr>
+            <p:cNvPr id="9" name="Rectangle 8"/>
             <p:cNvSpPr/>
             <p:nvPr/>
           </p:nvSpPr>
@@ -4201,7 +4620,38 @@
         </p:sp>
         <p:sp>
           <p:nvSpPr>
-            <p:cNvPr id="8" name="Rectangle 7"/>
+            <p:cNvPr id="10" name="TextBox 9"/>
+            <p:cNvSpPr txBox="1"/>
+            <p:nvPr/>
+          </p:nvSpPr>
+          <p:spPr>
+            <a:xfrm>
+              <a:off x="2770909" y="6400800"/>
+              <a:ext cx="2770909" cy="228600"/>
+            </a:xfrm>
+            <a:prstGeom prst="rect">
+              <a:avLst/>
+            </a:prstGeom>
+            <a:noFill/>
+          </p:spPr>
+          <p:txBody>
+            <a:bodyPr wrap="none">
+              <a:spAutoFit/>
+            </a:bodyPr>
+            <a:lstStyle/>
+            <a:p>
+              <a:pPr>
+                <a:defRPr sz="1200"/>
+              </a:pPr>
+              <a:r>
+                <a:t>chapter2</a:t>
+              </a:r>
+            </a:p>
+          </p:txBody>
+        </p:sp>
+        <p:sp>
+          <p:nvSpPr>
+            <p:cNvPr id="11" name="Rectangle 10"/>
             <p:cNvSpPr/>
             <p:nvPr/>
           </p:nvSpPr>
@@ -4244,7 +4694,38 @@
         </p:sp>
         <p:sp>
           <p:nvSpPr>
-            <p:cNvPr id="9" name="Rectangle 8"/>
+            <p:cNvPr id="12" name="TextBox 11"/>
+            <p:cNvSpPr txBox="1"/>
+            <p:nvPr/>
+          </p:nvSpPr>
+          <p:spPr>
+            <a:xfrm>
+              <a:off x="5541818" y="6400800"/>
+              <a:ext cx="1662545" cy="228600"/>
+            </a:xfrm>
+            <a:prstGeom prst="rect">
+              <a:avLst/>
+            </a:prstGeom>
+            <a:noFill/>
+          </p:spPr>
+          <p:txBody>
+            <a:bodyPr wrap="none">
+              <a:spAutoFit/>
+            </a:bodyPr>
+            <a:lstStyle/>
+            <a:p>
+              <a:pPr>
+                <a:defRPr sz="1200"/>
+              </a:pPr>
+              <a:r>
+                <a:t>chapter3</a:t>
+              </a:r>
+            </a:p>
+          </p:txBody>
+        </p:sp>
+        <p:sp>
+          <p:nvSpPr>
+            <p:cNvPr id="13" name="Rectangle 12"/>
             <p:cNvSpPr/>
             <p:nvPr/>
           </p:nvSpPr>
@@ -4362,10 +4843,10 @@
         </p:nvGrpSpPr>
         <p:grpSpPr>
           <a:xfrm>
-            <a:off x="0" y="6629400"/>
-            <a:ext cx="12191999" cy="228600"/>
-            <a:chOff x="0" y="6629400"/>
-            <a:chExt cx="12191999" cy="228600"/>
+            <a:off x="0" y="6400800"/>
+            <a:ext cx="12191999" cy="457200"/>
+            <a:chOff x="0" y="6400800"/>
+            <a:chExt cx="12191999" cy="457200"/>
           </a:xfrm>
         </p:grpSpPr>
         <p:sp>
@@ -4413,7 +4894,35 @@
         </p:sp>
         <p:sp>
           <p:nvSpPr>
-            <p:cNvPr id="6" name="Rectangle 5"/>
+            <p:cNvPr id="6" name="TextBox 5"/>
+            <p:cNvSpPr txBox="1"/>
+            <p:nvPr/>
+          </p:nvSpPr>
+          <p:spPr>
+            <a:xfrm>
+              <a:off x="0" y="6400800"/>
+              <a:ext cx="1108363" cy="228600"/>
+            </a:xfrm>
+            <a:prstGeom prst="rect">
+              <a:avLst/>
+            </a:prstGeom>
+            <a:noFill/>
+          </p:spPr>
+          <p:txBody>
+            <a:bodyPr wrap="none">
+              <a:spAutoFit/>
+            </a:bodyPr>
+            <a:lstStyle/>
+            <a:p>
+              <a:pPr>
+                <a:defRPr sz="1200"/>
+              </a:pPr>
+            </a:p>
+          </p:txBody>
+        </p:sp>
+        <p:sp>
+          <p:nvSpPr>
+            <p:cNvPr id="7" name="Rectangle 6"/>
             <p:cNvSpPr/>
             <p:nvPr/>
           </p:nvSpPr>
@@ -4456,7 +4965,38 @@
         </p:sp>
         <p:sp>
           <p:nvSpPr>
-            <p:cNvPr id="7" name="Rectangle 6"/>
+            <p:cNvPr id="8" name="TextBox 7"/>
+            <p:cNvSpPr txBox="1"/>
+            <p:nvPr/>
+          </p:nvSpPr>
+          <p:spPr>
+            <a:xfrm>
+              <a:off x="1108363" y="6400800"/>
+              <a:ext cx="1662545" cy="228600"/>
+            </a:xfrm>
+            <a:prstGeom prst="rect">
+              <a:avLst/>
+            </a:prstGeom>
+            <a:noFill/>
+          </p:spPr>
+          <p:txBody>
+            <a:bodyPr wrap="none">
+              <a:spAutoFit/>
+            </a:bodyPr>
+            <a:lstStyle/>
+            <a:p>
+              <a:pPr>
+                <a:defRPr sz="1200"/>
+              </a:pPr>
+              <a:r>
+                <a:t>chapter1</a:t>
+              </a:r>
+            </a:p>
+          </p:txBody>
+        </p:sp>
+        <p:sp>
+          <p:nvSpPr>
+            <p:cNvPr id="9" name="Rectangle 8"/>
             <p:cNvSpPr/>
             <p:nvPr/>
           </p:nvSpPr>
@@ -4499,7 +5039,38 @@
         </p:sp>
         <p:sp>
           <p:nvSpPr>
-            <p:cNvPr id="8" name="Rectangle 7"/>
+            <p:cNvPr id="10" name="TextBox 9"/>
+            <p:cNvSpPr txBox="1"/>
+            <p:nvPr/>
+          </p:nvSpPr>
+          <p:spPr>
+            <a:xfrm>
+              <a:off x="2770909" y="6400800"/>
+              <a:ext cx="2770909" cy="228600"/>
+            </a:xfrm>
+            <a:prstGeom prst="rect">
+              <a:avLst/>
+            </a:prstGeom>
+            <a:noFill/>
+          </p:spPr>
+          <p:txBody>
+            <a:bodyPr wrap="none">
+              <a:spAutoFit/>
+            </a:bodyPr>
+            <a:lstStyle/>
+            <a:p>
+              <a:pPr>
+                <a:defRPr sz="1200"/>
+              </a:pPr>
+              <a:r>
+                <a:t>chapter2</a:t>
+              </a:r>
+            </a:p>
+          </p:txBody>
+        </p:sp>
+        <p:sp>
+          <p:nvSpPr>
+            <p:cNvPr id="11" name="Rectangle 10"/>
             <p:cNvSpPr/>
             <p:nvPr/>
           </p:nvSpPr>
@@ -4542,7 +5113,38 @@
         </p:sp>
         <p:sp>
           <p:nvSpPr>
-            <p:cNvPr id="9" name="Rectangle 8"/>
+            <p:cNvPr id="12" name="TextBox 11"/>
+            <p:cNvSpPr txBox="1"/>
+            <p:nvPr/>
+          </p:nvSpPr>
+          <p:spPr>
+            <a:xfrm>
+              <a:off x="5541818" y="6400800"/>
+              <a:ext cx="2216727" cy="228600"/>
+            </a:xfrm>
+            <a:prstGeom prst="rect">
+              <a:avLst/>
+            </a:prstGeom>
+            <a:noFill/>
+          </p:spPr>
+          <p:txBody>
+            <a:bodyPr wrap="none">
+              <a:spAutoFit/>
+            </a:bodyPr>
+            <a:lstStyle/>
+            <a:p>
+              <a:pPr>
+                <a:defRPr sz="1200"/>
+              </a:pPr>
+              <a:r>
+                <a:t>chapter3</a:t>
+              </a:r>
+            </a:p>
+          </p:txBody>
+        </p:sp>
+        <p:sp>
+          <p:nvSpPr>
+            <p:cNvPr id="13" name="Rectangle 12"/>
             <p:cNvSpPr/>
             <p:nvPr/>
           </p:nvSpPr>
@@ -4664,10 +5266,10 @@
         </p:nvGrpSpPr>
         <p:grpSpPr>
           <a:xfrm>
-            <a:off x="0" y="6629400"/>
-            <a:ext cx="12191999" cy="228600"/>
-            <a:chOff x="0" y="6629400"/>
-            <a:chExt cx="12191999" cy="228600"/>
+            <a:off x="0" y="6400800"/>
+            <a:ext cx="12191999" cy="457200"/>
+            <a:chOff x="0" y="6400800"/>
+            <a:chExt cx="12191999" cy="457200"/>
           </a:xfrm>
         </p:grpSpPr>
         <p:sp>
@@ -4715,7 +5317,35 @@
         </p:sp>
         <p:sp>
           <p:nvSpPr>
-            <p:cNvPr id="7" name="Rectangle 6"/>
+            <p:cNvPr id="7" name="TextBox 6"/>
+            <p:cNvSpPr txBox="1"/>
+            <p:nvPr/>
+          </p:nvSpPr>
+          <p:spPr>
+            <a:xfrm>
+              <a:off x="0" y="6400800"/>
+              <a:ext cx="1108363" cy="228600"/>
+            </a:xfrm>
+            <a:prstGeom prst="rect">
+              <a:avLst/>
+            </a:prstGeom>
+            <a:noFill/>
+          </p:spPr>
+          <p:txBody>
+            <a:bodyPr wrap="none">
+              <a:spAutoFit/>
+            </a:bodyPr>
+            <a:lstStyle/>
+            <a:p>
+              <a:pPr>
+                <a:defRPr sz="1200"/>
+              </a:pPr>
+            </a:p>
+          </p:txBody>
+        </p:sp>
+        <p:sp>
+          <p:nvSpPr>
+            <p:cNvPr id="8" name="Rectangle 7"/>
             <p:cNvSpPr/>
             <p:nvPr/>
           </p:nvSpPr>
@@ -4758,7 +5388,38 @@
         </p:sp>
         <p:sp>
           <p:nvSpPr>
-            <p:cNvPr id="8" name="Rectangle 7"/>
+            <p:cNvPr id="9" name="TextBox 8"/>
+            <p:cNvSpPr txBox="1"/>
+            <p:nvPr/>
+          </p:nvSpPr>
+          <p:spPr>
+            <a:xfrm>
+              <a:off x="1108363" y="6400800"/>
+              <a:ext cx="1662545" cy="228600"/>
+            </a:xfrm>
+            <a:prstGeom prst="rect">
+              <a:avLst/>
+            </a:prstGeom>
+            <a:noFill/>
+          </p:spPr>
+          <p:txBody>
+            <a:bodyPr wrap="none">
+              <a:spAutoFit/>
+            </a:bodyPr>
+            <a:lstStyle/>
+            <a:p>
+              <a:pPr>
+                <a:defRPr sz="1200"/>
+              </a:pPr>
+              <a:r>
+                <a:t>chapter1</a:t>
+              </a:r>
+            </a:p>
+          </p:txBody>
+        </p:sp>
+        <p:sp>
+          <p:nvSpPr>
+            <p:cNvPr id="10" name="Rectangle 9"/>
             <p:cNvSpPr/>
             <p:nvPr/>
           </p:nvSpPr>
@@ -4801,7 +5462,38 @@
         </p:sp>
         <p:sp>
           <p:nvSpPr>
-            <p:cNvPr id="9" name="Rectangle 8"/>
+            <p:cNvPr id="11" name="TextBox 10"/>
+            <p:cNvSpPr txBox="1"/>
+            <p:nvPr/>
+          </p:nvSpPr>
+          <p:spPr>
+            <a:xfrm>
+              <a:off x="2770909" y="6400800"/>
+              <a:ext cx="2770909" cy="228600"/>
+            </a:xfrm>
+            <a:prstGeom prst="rect">
+              <a:avLst/>
+            </a:prstGeom>
+            <a:noFill/>
+          </p:spPr>
+          <p:txBody>
+            <a:bodyPr wrap="none">
+              <a:spAutoFit/>
+            </a:bodyPr>
+            <a:lstStyle/>
+            <a:p>
+              <a:pPr>
+                <a:defRPr sz="1200"/>
+              </a:pPr>
+              <a:r>
+                <a:t>chapter2</a:t>
+              </a:r>
+            </a:p>
+          </p:txBody>
+        </p:sp>
+        <p:sp>
+          <p:nvSpPr>
+            <p:cNvPr id="12" name="Rectangle 11"/>
             <p:cNvSpPr/>
             <p:nvPr/>
           </p:nvSpPr>
@@ -4844,7 +5536,38 @@
         </p:sp>
         <p:sp>
           <p:nvSpPr>
-            <p:cNvPr id="10" name="Rectangle 9"/>
+            <p:cNvPr id="13" name="TextBox 12"/>
+            <p:cNvSpPr txBox="1"/>
+            <p:nvPr/>
+          </p:nvSpPr>
+          <p:spPr>
+            <a:xfrm>
+              <a:off x="5541818" y="6400800"/>
+              <a:ext cx="2216727" cy="228600"/>
+            </a:xfrm>
+            <a:prstGeom prst="rect">
+              <a:avLst/>
+            </a:prstGeom>
+            <a:noFill/>
+          </p:spPr>
+          <p:txBody>
+            <a:bodyPr wrap="none">
+              <a:spAutoFit/>
+            </a:bodyPr>
+            <a:lstStyle/>
+            <a:p>
+              <a:pPr>
+                <a:defRPr sz="1200"/>
+              </a:pPr>
+              <a:r>
+                <a:t>chapter3</a:t>
+              </a:r>
+            </a:p>
+          </p:txBody>
+        </p:sp>
+        <p:sp>
+          <p:nvSpPr>
+            <p:cNvPr id="14" name="Rectangle 13"/>
             <p:cNvSpPr/>
             <p:nvPr/>
           </p:nvSpPr>
@@ -4887,7 +5610,38 @@
         </p:sp>
         <p:sp>
           <p:nvSpPr>
-            <p:cNvPr id="11" name="Rectangle 10"/>
+            <p:cNvPr id="15" name="TextBox 14"/>
+            <p:cNvSpPr txBox="1"/>
+            <p:nvPr/>
+          </p:nvSpPr>
+          <p:spPr>
+            <a:xfrm>
+              <a:off x="7758545" y="6400800"/>
+              <a:ext cx="554181" cy="228600"/>
+            </a:xfrm>
+            <a:prstGeom prst="rect">
+              <a:avLst/>
+            </a:prstGeom>
+            <a:noFill/>
+          </p:spPr>
+          <p:txBody>
+            <a:bodyPr wrap="none">
+              <a:spAutoFit/>
+            </a:bodyPr>
+            <a:lstStyle/>
+            <a:p>
+              <a:pPr>
+                <a:defRPr sz="1200"/>
+              </a:pPr>
+              <a:r>
+                <a:t>chapter4</a:t>
+              </a:r>
+            </a:p>
+          </p:txBody>
+        </p:sp>
+        <p:sp>
+          <p:nvSpPr>
+            <p:cNvPr id="16" name="Rectangle 15"/>
             <p:cNvSpPr/>
             <p:nvPr/>
           </p:nvSpPr>
@@ -5009,10 +5763,10 @@
         </p:nvGrpSpPr>
         <p:grpSpPr>
           <a:xfrm>
-            <a:off x="0" y="6629400"/>
-            <a:ext cx="12191999" cy="228600"/>
-            <a:chOff x="0" y="6629400"/>
-            <a:chExt cx="12191999" cy="228600"/>
+            <a:off x="0" y="6400800"/>
+            <a:ext cx="12191999" cy="457200"/>
+            <a:chOff x="0" y="6400800"/>
+            <a:chExt cx="12191999" cy="457200"/>
           </a:xfrm>
         </p:grpSpPr>
         <p:sp>
@@ -5060,7 +5814,35 @@
         </p:sp>
         <p:sp>
           <p:nvSpPr>
-            <p:cNvPr id="7" name="Rectangle 6"/>
+            <p:cNvPr id="7" name="TextBox 6"/>
+            <p:cNvSpPr txBox="1"/>
+            <p:nvPr/>
+          </p:nvSpPr>
+          <p:spPr>
+            <a:xfrm>
+              <a:off x="0" y="6400800"/>
+              <a:ext cx="1108363" cy="228600"/>
+            </a:xfrm>
+            <a:prstGeom prst="rect">
+              <a:avLst/>
+            </a:prstGeom>
+            <a:noFill/>
+          </p:spPr>
+          <p:txBody>
+            <a:bodyPr wrap="none">
+              <a:spAutoFit/>
+            </a:bodyPr>
+            <a:lstStyle/>
+            <a:p>
+              <a:pPr>
+                <a:defRPr sz="1200"/>
+              </a:pPr>
+            </a:p>
+          </p:txBody>
+        </p:sp>
+        <p:sp>
+          <p:nvSpPr>
+            <p:cNvPr id="8" name="Rectangle 7"/>
             <p:cNvSpPr/>
             <p:nvPr/>
           </p:nvSpPr>
@@ -5103,7 +5885,38 @@
         </p:sp>
         <p:sp>
           <p:nvSpPr>
-            <p:cNvPr id="8" name="Rectangle 7"/>
+            <p:cNvPr id="9" name="TextBox 8"/>
+            <p:cNvSpPr txBox="1"/>
+            <p:nvPr/>
+          </p:nvSpPr>
+          <p:spPr>
+            <a:xfrm>
+              <a:off x="1108363" y="6400800"/>
+              <a:ext cx="1662545" cy="228600"/>
+            </a:xfrm>
+            <a:prstGeom prst="rect">
+              <a:avLst/>
+            </a:prstGeom>
+            <a:noFill/>
+          </p:spPr>
+          <p:txBody>
+            <a:bodyPr wrap="none">
+              <a:spAutoFit/>
+            </a:bodyPr>
+            <a:lstStyle/>
+            <a:p>
+              <a:pPr>
+                <a:defRPr sz="1200"/>
+              </a:pPr>
+              <a:r>
+                <a:t>chapter1</a:t>
+              </a:r>
+            </a:p>
+          </p:txBody>
+        </p:sp>
+        <p:sp>
+          <p:nvSpPr>
+            <p:cNvPr id="10" name="Rectangle 9"/>
             <p:cNvSpPr/>
             <p:nvPr/>
           </p:nvSpPr>
@@ -5146,7 +5959,38 @@
         </p:sp>
         <p:sp>
           <p:nvSpPr>
-            <p:cNvPr id="9" name="Rectangle 8"/>
+            <p:cNvPr id="11" name="TextBox 10"/>
+            <p:cNvSpPr txBox="1"/>
+            <p:nvPr/>
+          </p:nvSpPr>
+          <p:spPr>
+            <a:xfrm>
+              <a:off x="2770909" y="6400800"/>
+              <a:ext cx="2770909" cy="228600"/>
+            </a:xfrm>
+            <a:prstGeom prst="rect">
+              <a:avLst/>
+            </a:prstGeom>
+            <a:noFill/>
+          </p:spPr>
+          <p:txBody>
+            <a:bodyPr wrap="none">
+              <a:spAutoFit/>
+            </a:bodyPr>
+            <a:lstStyle/>
+            <a:p>
+              <a:pPr>
+                <a:defRPr sz="1200"/>
+              </a:pPr>
+              <a:r>
+                <a:t>chapter2</a:t>
+              </a:r>
+            </a:p>
+          </p:txBody>
+        </p:sp>
+        <p:sp>
+          <p:nvSpPr>
+            <p:cNvPr id="12" name="Rectangle 11"/>
             <p:cNvSpPr/>
             <p:nvPr/>
           </p:nvSpPr>
@@ -5189,7 +6033,38 @@
         </p:sp>
         <p:sp>
           <p:nvSpPr>
-            <p:cNvPr id="10" name="Rectangle 9"/>
+            <p:cNvPr id="13" name="TextBox 12"/>
+            <p:cNvSpPr txBox="1"/>
+            <p:nvPr/>
+          </p:nvSpPr>
+          <p:spPr>
+            <a:xfrm>
+              <a:off x="5541818" y="6400800"/>
+              <a:ext cx="2216727" cy="228600"/>
+            </a:xfrm>
+            <a:prstGeom prst="rect">
+              <a:avLst/>
+            </a:prstGeom>
+            <a:noFill/>
+          </p:spPr>
+          <p:txBody>
+            <a:bodyPr wrap="none">
+              <a:spAutoFit/>
+            </a:bodyPr>
+            <a:lstStyle/>
+            <a:p>
+              <a:pPr>
+                <a:defRPr sz="1200"/>
+              </a:pPr>
+              <a:r>
+                <a:t>chapter3</a:t>
+              </a:r>
+            </a:p>
+          </p:txBody>
+        </p:sp>
+        <p:sp>
+          <p:nvSpPr>
+            <p:cNvPr id="14" name="Rectangle 13"/>
             <p:cNvSpPr/>
             <p:nvPr/>
           </p:nvSpPr>
@@ -5232,7 +6107,38 @@
         </p:sp>
         <p:sp>
           <p:nvSpPr>
-            <p:cNvPr id="11" name="Rectangle 10"/>
+            <p:cNvPr id="15" name="TextBox 14"/>
+            <p:cNvSpPr txBox="1"/>
+            <p:nvPr/>
+          </p:nvSpPr>
+          <p:spPr>
+            <a:xfrm>
+              <a:off x="7758545" y="6400800"/>
+              <a:ext cx="554181" cy="228600"/>
+            </a:xfrm>
+            <a:prstGeom prst="rect">
+              <a:avLst/>
+            </a:prstGeom>
+            <a:noFill/>
+          </p:spPr>
+          <p:txBody>
+            <a:bodyPr wrap="none">
+              <a:spAutoFit/>
+            </a:bodyPr>
+            <a:lstStyle/>
+            <a:p>
+              <a:pPr>
+                <a:defRPr sz="1200"/>
+              </a:pPr>
+              <a:r>
+                <a:t>chapter4</a:t>
+              </a:r>
+            </a:p>
+          </p:txBody>
+        </p:sp>
+        <p:sp>
+          <p:nvSpPr>
+            <p:cNvPr id="16" name="Rectangle 15"/>
             <p:cNvSpPr/>
             <p:nvPr/>
           </p:nvSpPr>
@@ -5275,7 +6181,38 @@
         </p:sp>
         <p:sp>
           <p:nvSpPr>
-            <p:cNvPr id="12" name="Rectangle 11"/>
+            <p:cNvPr id="17" name="TextBox 16"/>
+            <p:cNvSpPr txBox="1"/>
+            <p:nvPr/>
+          </p:nvSpPr>
+          <p:spPr>
+            <a:xfrm>
+              <a:off x="8312727" y="6400800"/>
+              <a:ext cx="554181" cy="228600"/>
+            </a:xfrm>
+            <a:prstGeom prst="rect">
+              <a:avLst/>
+            </a:prstGeom>
+            <a:noFill/>
+          </p:spPr>
+          <p:txBody>
+            <a:bodyPr wrap="none">
+              <a:spAutoFit/>
+            </a:bodyPr>
+            <a:lstStyle/>
+            <a:p>
+              <a:pPr>
+                <a:defRPr sz="1200"/>
+              </a:pPr>
+              <a:r>
+                <a:t>chapter5</a:t>
+              </a:r>
+            </a:p>
+          </p:txBody>
+        </p:sp>
+        <p:sp>
+          <p:nvSpPr>
+            <p:cNvPr id="18" name="Rectangle 17"/>
             <p:cNvSpPr/>
             <p:nvPr/>
           </p:nvSpPr>
@@ -5393,10 +6330,10 @@
         </p:nvGrpSpPr>
         <p:grpSpPr>
           <a:xfrm>
-            <a:off x="0" y="6629400"/>
-            <a:ext cx="12191999" cy="228600"/>
-            <a:chOff x="0" y="6629400"/>
-            <a:chExt cx="12191999" cy="228600"/>
+            <a:off x="0" y="6400800"/>
+            <a:ext cx="12191999" cy="457200"/>
+            <a:chOff x="0" y="6400800"/>
+            <a:chExt cx="12191999" cy="457200"/>
           </a:xfrm>
         </p:grpSpPr>
         <p:sp>
@@ -5444,7 +6381,35 @@
         </p:sp>
         <p:sp>
           <p:nvSpPr>
-            <p:cNvPr id="6" name="Rectangle 5"/>
+            <p:cNvPr id="6" name="TextBox 5"/>
+            <p:cNvSpPr txBox="1"/>
+            <p:nvPr/>
+          </p:nvSpPr>
+          <p:spPr>
+            <a:xfrm>
+              <a:off x="0" y="6400800"/>
+              <a:ext cx="1108363" cy="228600"/>
+            </a:xfrm>
+            <a:prstGeom prst="rect">
+              <a:avLst/>
+            </a:prstGeom>
+            <a:noFill/>
+          </p:spPr>
+          <p:txBody>
+            <a:bodyPr wrap="none">
+              <a:spAutoFit/>
+            </a:bodyPr>
+            <a:lstStyle/>
+            <a:p>
+              <a:pPr>
+                <a:defRPr sz="1200"/>
+              </a:pPr>
+            </a:p>
+          </p:txBody>
+        </p:sp>
+        <p:sp>
+          <p:nvSpPr>
+            <p:cNvPr id="7" name="Rectangle 6"/>
             <p:cNvSpPr/>
             <p:nvPr/>
           </p:nvSpPr>
@@ -5487,7 +6452,38 @@
         </p:sp>
         <p:sp>
           <p:nvSpPr>
-            <p:cNvPr id="7" name="Rectangle 6"/>
+            <p:cNvPr id="8" name="TextBox 7"/>
+            <p:cNvSpPr txBox="1"/>
+            <p:nvPr/>
+          </p:nvSpPr>
+          <p:spPr>
+            <a:xfrm>
+              <a:off x="1108363" y="6400800"/>
+              <a:ext cx="1662545" cy="228600"/>
+            </a:xfrm>
+            <a:prstGeom prst="rect">
+              <a:avLst/>
+            </a:prstGeom>
+            <a:noFill/>
+          </p:spPr>
+          <p:txBody>
+            <a:bodyPr wrap="none">
+              <a:spAutoFit/>
+            </a:bodyPr>
+            <a:lstStyle/>
+            <a:p>
+              <a:pPr>
+                <a:defRPr sz="1200"/>
+              </a:pPr>
+              <a:r>
+                <a:t>chapter1</a:t>
+              </a:r>
+            </a:p>
+          </p:txBody>
+        </p:sp>
+        <p:sp>
+          <p:nvSpPr>
+            <p:cNvPr id="9" name="Rectangle 8"/>
             <p:cNvSpPr/>
             <p:nvPr/>
           </p:nvSpPr>
@@ -5530,7 +6526,38 @@
         </p:sp>
         <p:sp>
           <p:nvSpPr>
-            <p:cNvPr id="8" name="Rectangle 7"/>
+            <p:cNvPr id="10" name="TextBox 9"/>
+            <p:cNvSpPr txBox="1"/>
+            <p:nvPr/>
+          </p:nvSpPr>
+          <p:spPr>
+            <a:xfrm>
+              <a:off x="2770909" y="6400800"/>
+              <a:ext cx="2770909" cy="228600"/>
+            </a:xfrm>
+            <a:prstGeom prst="rect">
+              <a:avLst/>
+            </a:prstGeom>
+            <a:noFill/>
+          </p:spPr>
+          <p:txBody>
+            <a:bodyPr wrap="none">
+              <a:spAutoFit/>
+            </a:bodyPr>
+            <a:lstStyle/>
+            <a:p>
+              <a:pPr>
+                <a:defRPr sz="1200"/>
+              </a:pPr>
+              <a:r>
+                <a:t>chapter2</a:t>
+              </a:r>
+            </a:p>
+          </p:txBody>
+        </p:sp>
+        <p:sp>
+          <p:nvSpPr>
+            <p:cNvPr id="11" name="Rectangle 10"/>
             <p:cNvSpPr/>
             <p:nvPr/>
           </p:nvSpPr>
@@ -5573,7 +6600,38 @@
         </p:sp>
         <p:sp>
           <p:nvSpPr>
-            <p:cNvPr id="9" name="Rectangle 8"/>
+            <p:cNvPr id="12" name="TextBox 11"/>
+            <p:cNvSpPr txBox="1"/>
+            <p:nvPr/>
+          </p:nvSpPr>
+          <p:spPr>
+            <a:xfrm>
+              <a:off x="5541818" y="6400800"/>
+              <a:ext cx="2216727" cy="228600"/>
+            </a:xfrm>
+            <a:prstGeom prst="rect">
+              <a:avLst/>
+            </a:prstGeom>
+            <a:noFill/>
+          </p:spPr>
+          <p:txBody>
+            <a:bodyPr wrap="none">
+              <a:spAutoFit/>
+            </a:bodyPr>
+            <a:lstStyle/>
+            <a:p>
+              <a:pPr>
+                <a:defRPr sz="1200"/>
+              </a:pPr>
+              <a:r>
+                <a:t>chapter3</a:t>
+              </a:r>
+            </a:p>
+          </p:txBody>
+        </p:sp>
+        <p:sp>
+          <p:nvSpPr>
+            <p:cNvPr id="13" name="Rectangle 12"/>
             <p:cNvSpPr/>
             <p:nvPr/>
           </p:nvSpPr>
@@ -5616,7 +6674,38 @@
         </p:sp>
         <p:sp>
           <p:nvSpPr>
-            <p:cNvPr id="10" name="Rectangle 9"/>
+            <p:cNvPr id="14" name="TextBox 13"/>
+            <p:cNvSpPr txBox="1"/>
+            <p:nvPr/>
+          </p:nvSpPr>
+          <p:spPr>
+            <a:xfrm>
+              <a:off x="7758545" y="6400800"/>
+              <a:ext cx="554181" cy="228600"/>
+            </a:xfrm>
+            <a:prstGeom prst="rect">
+              <a:avLst/>
+            </a:prstGeom>
+            <a:noFill/>
+          </p:spPr>
+          <p:txBody>
+            <a:bodyPr wrap="none">
+              <a:spAutoFit/>
+            </a:bodyPr>
+            <a:lstStyle/>
+            <a:p>
+              <a:pPr>
+                <a:defRPr sz="1200"/>
+              </a:pPr>
+              <a:r>
+                <a:t>chapter4</a:t>
+              </a:r>
+            </a:p>
+          </p:txBody>
+        </p:sp>
+        <p:sp>
+          <p:nvSpPr>
+            <p:cNvPr id="15" name="Rectangle 14"/>
             <p:cNvSpPr/>
             <p:nvPr/>
           </p:nvSpPr>
@@ -5659,7 +6748,38 @@
         </p:sp>
         <p:sp>
           <p:nvSpPr>
-            <p:cNvPr id="11" name="Rectangle 10"/>
+            <p:cNvPr id="16" name="TextBox 15"/>
+            <p:cNvSpPr txBox="1"/>
+            <p:nvPr/>
+          </p:nvSpPr>
+          <p:spPr>
+            <a:xfrm>
+              <a:off x="8312727" y="6400800"/>
+              <a:ext cx="1108363" cy="228600"/>
+            </a:xfrm>
+            <a:prstGeom prst="rect">
+              <a:avLst/>
+            </a:prstGeom>
+            <a:noFill/>
+          </p:spPr>
+          <p:txBody>
+            <a:bodyPr wrap="none">
+              <a:spAutoFit/>
+            </a:bodyPr>
+            <a:lstStyle/>
+            <a:p>
+              <a:pPr>
+                <a:defRPr sz="1200"/>
+              </a:pPr>
+              <a:r>
+                <a:t>chapter5</a:t>
+              </a:r>
+            </a:p>
+          </p:txBody>
+        </p:sp>
+        <p:sp>
+          <p:nvSpPr>
+            <p:cNvPr id="17" name="Rectangle 16"/>
             <p:cNvSpPr/>
             <p:nvPr/>
           </p:nvSpPr>
@@ -5777,10 +6897,10 @@
         </p:nvGrpSpPr>
         <p:grpSpPr>
           <a:xfrm>
-            <a:off x="0" y="6629400"/>
-            <a:ext cx="12191999" cy="228600"/>
-            <a:chOff x="0" y="6629400"/>
-            <a:chExt cx="12191999" cy="228600"/>
+            <a:off x="0" y="6400800"/>
+            <a:ext cx="12191999" cy="457200"/>
+            <a:chOff x="0" y="6400800"/>
+            <a:chExt cx="12191999" cy="457200"/>
           </a:xfrm>
         </p:grpSpPr>
         <p:sp>
@@ -5828,7 +6948,35 @@
         </p:sp>
         <p:sp>
           <p:nvSpPr>
-            <p:cNvPr id="6" name="Rectangle 5"/>
+            <p:cNvPr id="6" name="TextBox 5"/>
+            <p:cNvSpPr txBox="1"/>
+            <p:nvPr/>
+          </p:nvSpPr>
+          <p:spPr>
+            <a:xfrm>
+              <a:off x="0" y="6400800"/>
+              <a:ext cx="1108363" cy="228600"/>
+            </a:xfrm>
+            <a:prstGeom prst="rect">
+              <a:avLst/>
+            </a:prstGeom>
+            <a:noFill/>
+          </p:spPr>
+          <p:txBody>
+            <a:bodyPr wrap="none">
+              <a:spAutoFit/>
+            </a:bodyPr>
+            <a:lstStyle/>
+            <a:p>
+              <a:pPr>
+                <a:defRPr sz="1200"/>
+              </a:pPr>
+            </a:p>
+          </p:txBody>
+        </p:sp>
+        <p:sp>
+          <p:nvSpPr>
+            <p:cNvPr id="7" name="Rectangle 6"/>
             <p:cNvSpPr/>
             <p:nvPr/>
           </p:nvSpPr>
@@ -5871,7 +7019,38 @@
         </p:sp>
         <p:sp>
           <p:nvSpPr>
-            <p:cNvPr id="7" name="Rectangle 6"/>
+            <p:cNvPr id="8" name="TextBox 7"/>
+            <p:cNvSpPr txBox="1"/>
+            <p:nvPr/>
+          </p:nvSpPr>
+          <p:spPr>
+            <a:xfrm>
+              <a:off x="1108363" y="6400800"/>
+              <a:ext cx="1662545" cy="228600"/>
+            </a:xfrm>
+            <a:prstGeom prst="rect">
+              <a:avLst/>
+            </a:prstGeom>
+            <a:noFill/>
+          </p:spPr>
+          <p:txBody>
+            <a:bodyPr wrap="none">
+              <a:spAutoFit/>
+            </a:bodyPr>
+            <a:lstStyle/>
+            <a:p>
+              <a:pPr>
+                <a:defRPr sz="1200"/>
+              </a:pPr>
+              <a:r>
+                <a:t>chapter1</a:t>
+              </a:r>
+            </a:p>
+          </p:txBody>
+        </p:sp>
+        <p:sp>
+          <p:nvSpPr>
+            <p:cNvPr id="9" name="Rectangle 8"/>
             <p:cNvSpPr/>
             <p:nvPr/>
           </p:nvSpPr>
@@ -5914,7 +7093,38 @@
         </p:sp>
         <p:sp>
           <p:nvSpPr>
-            <p:cNvPr id="8" name="Rectangle 7"/>
+            <p:cNvPr id="10" name="TextBox 9"/>
+            <p:cNvSpPr txBox="1"/>
+            <p:nvPr/>
+          </p:nvSpPr>
+          <p:spPr>
+            <a:xfrm>
+              <a:off x="2770909" y="6400800"/>
+              <a:ext cx="2770909" cy="228600"/>
+            </a:xfrm>
+            <a:prstGeom prst="rect">
+              <a:avLst/>
+            </a:prstGeom>
+            <a:noFill/>
+          </p:spPr>
+          <p:txBody>
+            <a:bodyPr wrap="none">
+              <a:spAutoFit/>
+            </a:bodyPr>
+            <a:lstStyle/>
+            <a:p>
+              <a:pPr>
+                <a:defRPr sz="1200"/>
+              </a:pPr>
+              <a:r>
+                <a:t>chapter2</a:t>
+              </a:r>
+            </a:p>
+          </p:txBody>
+        </p:sp>
+        <p:sp>
+          <p:nvSpPr>
+            <p:cNvPr id="11" name="Rectangle 10"/>
             <p:cNvSpPr/>
             <p:nvPr/>
           </p:nvSpPr>
@@ -5957,7 +7167,38 @@
         </p:sp>
         <p:sp>
           <p:nvSpPr>
-            <p:cNvPr id="9" name="Rectangle 8"/>
+            <p:cNvPr id="12" name="TextBox 11"/>
+            <p:cNvSpPr txBox="1"/>
+            <p:nvPr/>
+          </p:nvSpPr>
+          <p:spPr>
+            <a:xfrm>
+              <a:off x="5541818" y="6400800"/>
+              <a:ext cx="2216727" cy="228600"/>
+            </a:xfrm>
+            <a:prstGeom prst="rect">
+              <a:avLst/>
+            </a:prstGeom>
+            <a:noFill/>
+          </p:spPr>
+          <p:txBody>
+            <a:bodyPr wrap="none">
+              <a:spAutoFit/>
+            </a:bodyPr>
+            <a:lstStyle/>
+            <a:p>
+              <a:pPr>
+                <a:defRPr sz="1200"/>
+              </a:pPr>
+              <a:r>
+                <a:t>chapter3</a:t>
+              </a:r>
+            </a:p>
+          </p:txBody>
+        </p:sp>
+        <p:sp>
+          <p:nvSpPr>
+            <p:cNvPr id="13" name="Rectangle 12"/>
             <p:cNvSpPr/>
             <p:nvPr/>
           </p:nvSpPr>
@@ -6000,7 +7241,38 @@
         </p:sp>
         <p:sp>
           <p:nvSpPr>
-            <p:cNvPr id="10" name="Rectangle 9"/>
+            <p:cNvPr id="14" name="TextBox 13"/>
+            <p:cNvSpPr txBox="1"/>
+            <p:nvPr/>
+          </p:nvSpPr>
+          <p:spPr>
+            <a:xfrm>
+              <a:off x="7758545" y="6400800"/>
+              <a:ext cx="554181" cy="228600"/>
+            </a:xfrm>
+            <a:prstGeom prst="rect">
+              <a:avLst/>
+            </a:prstGeom>
+            <a:noFill/>
+          </p:spPr>
+          <p:txBody>
+            <a:bodyPr wrap="none">
+              <a:spAutoFit/>
+            </a:bodyPr>
+            <a:lstStyle/>
+            <a:p>
+              <a:pPr>
+                <a:defRPr sz="1200"/>
+              </a:pPr>
+              <a:r>
+                <a:t>chapter4</a:t>
+              </a:r>
+            </a:p>
+          </p:txBody>
+        </p:sp>
+        <p:sp>
+          <p:nvSpPr>
+            <p:cNvPr id="15" name="Rectangle 14"/>
             <p:cNvSpPr/>
             <p:nvPr/>
           </p:nvSpPr>
@@ -6043,7 +7315,38 @@
         </p:sp>
         <p:sp>
           <p:nvSpPr>
-            <p:cNvPr id="11" name="Rectangle 10"/>
+            <p:cNvPr id="16" name="TextBox 15"/>
+            <p:cNvSpPr txBox="1"/>
+            <p:nvPr/>
+          </p:nvSpPr>
+          <p:spPr>
+            <a:xfrm>
+              <a:off x="8312727" y="6400800"/>
+              <a:ext cx="1662545" cy="228600"/>
+            </a:xfrm>
+            <a:prstGeom prst="rect">
+              <a:avLst/>
+            </a:prstGeom>
+            <a:noFill/>
+          </p:spPr>
+          <p:txBody>
+            <a:bodyPr wrap="none">
+              <a:spAutoFit/>
+            </a:bodyPr>
+            <a:lstStyle/>
+            <a:p>
+              <a:pPr>
+                <a:defRPr sz="1200"/>
+              </a:pPr>
+              <a:r>
+                <a:t>chapter5</a:t>
+              </a:r>
+            </a:p>
+          </p:txBody>
+        </p:sp>
+        <p:sp>
+          <p:nvSpPr>
+            <p:cNvPr id="17" name="Rectangle 16"/>
             <p:cNvSpPr/>
             <p:nvPr/>
           </p:nvSpPr>
@@ -6161,10 +7464,10 @@
         </p:nvGrpSpPr>
         <p:grpSpPr>
           <a:xfrm>
-            <a:off x="0" y="6629400"/>
-            <a:ext cx="12191999" cy="228600"/>
-            <a:chOff x="0" y="6629400"/>
-            <a:chExt cx="12191999" cy="228600"/>
+            <a:off x="0" y="6400800"/>
+            <a:ext cx="12191999" cy="457200"/>
+            <a:chOff x="0" y="6400800"/>
+            <a:chExt cx="12191999" cy="457200"/>
           </a:xfrm>
         </p:grpSpPr>
         <p:sp>
@@ -6212,7 +7515,35 @@
         </p:sp>
         <p:sp>
           <p:nvSpPr>
-            <p:cNvPr id="6" name="Rectangle 5"/>
+            <p:cNvPr id="6" name="TextBox 5"/>
+            <p:cNvSpPr txBox="1"/>
+            <p:nvPr/>
+          </p:nvSpPr>
+          <p:spPr>
+            <a:xfrm>
+              <a:off x="0" y="6400800"/>
+              <a:ext cx="1108363" cy="228600"/>
+            </a:xfrm>
+            <a:prstGeom prst="rect">
+              <a:avLst/>
+            </a:prstGeom>
+            <a:noFill/>
+          </p:spPr>
+          <p:txBody>
+            <a:bodyPr wrap="none">
+              <a:spAutoFit/>
+            </a:bodyPr>
+            <a:lstStyle/>
+            <a:p>
+              <a:pPr>
+                <a:defRPr sz="1200"/>
+              </a:pPr>
+            </a:p>
+          </p:txBody>
+        </p:sp>
+        <p:sp>
+          <p:nvSpPr>
+            <p:cNvPr id="7" name="Rectangle 6"/>
             <p:cNvSpPr/>
             <p:nvPr/>
           </p:nvSpPr>
@@ -6255,7 +7586,38 @@
         </p:sp>
         <p:sp>
           <p:nvSpPr>
-            <p:cNvPr id="7" name="Rectangle 6"/>
+            <p:cNvPr id="8" name="TextBox 7"/>
+            <p:cNvSpPr txBox="1"/>
+            <p:nvPr/>
+          </p:nvSpPr>
+          <p:spPr>
+            <a:xfrm>
+              <a:off x="1108363" y="6400800"/>
+              <a:ext cx="1662545" cy="228600"/>
+            </a:xfrm>
+            <a:prstGeom prst="rect">
+              <a:avLst/>
+            </a:prstGeom>
+            <a:noFill/>
+          </p:spPr>
+          <p:txBody>
+            <a:bodyPr wrap="none">
+              <a:spAutoFit/>
+            </a:bodyPr>
+            <a:lstStyle/>
+            <a:p>
+              <a:pPr>
+                <a:defRPr sz="1200"/>
+              </a:pPr>
+              <a:r>
+                <a:t>chapter1</a:t>
+              </a:r>
+            </a:p>
+          </p:txBody>
+        </p:sp>
+        <p:sp>
+          <p:nvSpPr>
+            <p:cNvPr id="9" name="Rectangle 8"/>
             <p:cNvSpPr/>
             <p:nvPr/>
           </p:nvSpPr>
@@ -6298,7 +7660,38 @@
         </p:sp>
         <p:sp>
           <p:nvSpPr>
-            <p:cNvPr id="8" name="Rectangle 7"/>
+            <p:cNvPr id="10" name="TextBox 9"/>
+            <p:cNvSpPr txBox="1"/>
+            <p:nvPr/>
+          </p:nvSpPr>
+          <p:spPr>
+            <a:xfrm>
+              <a:off x="2770909" y="6400800"/>
+              <a:ext cx="2770909" cy="228600"/>
+            </a:xfrm>
+            <a:prstGeom prst="rect">
+              <a:avLst/>
+            </a:prstGeom>
+            <a:noFill/>
+          </p:spPr>
+          <p:txBody>
+            <a:bodyPr wrap="none">
+              <a:spAutoFit/>
+            </a:bodyPr>
+            <a:lstStyle/>
+            <a:p>
+              <a:pPr>
+                <a:defRPr sz="1200"/>
+              </a:pPr>
+              <a:r>
+                <a:t>chapter2</a:t>
+              </a:r>
+            </a:p>
+          </p:txBody>
+        </p:sp>
+        <p:sp>
+          <p:nvSpPr>
+            <p:cNvPr id="11" name="Rectangle 10"/>
             <p:cNvSpPr/>
             <p:nvPr/>
           </p:nvSpPr>
@@ -6341,7 +7734,38 @@
         </p:sp>
         <p:sp>
           <p:nvSpPr>
-            <p:cNvPr id="9" name="Rectangle 8"/>
+            <p:cNvPr id="12" name="TextBox 11"/>
+            <p:cNvSpPr txBox="1"/>
+            <p:nvPr/>
+          </p:nvSpPr>
+          <p:spPr>
+            <a:xfrm>
+              <a:off x="5541818" y="6400800"/>
+              <a:ext cx="2216727" cy="228600"/>
+            </a:xfrm>
+            <a:prstGeom prst="rect">
+              <a:avLst/>
+            </a:prstGeom>
+            <a:noFill/>
+          </p:spPr>
+          <p:txBody>
+            <a:bodyPr wrap="none">
+              <a:spAutoFit/>
+            </a:bodyPr>
+            <a:lstStyle/>
+            <a:p>
+              <a:pPr>
+                <a:defRPr sz="1200"/>
+              </a:pPr>
+              <a:r>
+                <a:t>chapter3</a:t>
+              </a:r>
+            </a:p>
+          </p:txBody>
+        </p:sp>
+        <p:sp>
+          <p:nvSpPr>
+            <p:cNvPr id="13" name="Rectangle 12"/>
             <p:cNvSpPr/>
             <p:nvPr/>
           </p:nvSpPr>
@@ -6384,7 +7808,38 @@
         </p:sp>
         <p:sp>
           <p:nvSpPr>
-            <p:cNvPr id="10" name="Rectangle 9"/>
+            <p:cNvPr id="14" name="TextBox 13"/>
+            <p:cNvSpPr txBox="1"/>
+            <p:nvPr/>
+          </p:nvSpPr>
+          <p:spPr>
+            <a:xfrm>
+              <a:off x="7758545" y="6400800"/>
+              <a:ext cx="554181" cy="228600"/>
+            </a:xfrm>
+            <a:prstGeom prst="rect">
+              <a:avLst/>
+            </a:prstGeom>
+            <a:noFill/>
+          </p:spPr>
+          <p:txBody>
+            <a:bodyPr wrap="none">
+              <a:spAutoFit/>
+            </a:bodyPr>
+            <a:lstStyle/>
+            <a:p>
+              <a:pPr>
+                <a:defRPr sz="1200"/>
+              </a:pPr>
+              <a:r>
+                <a:t>chapter4</a:t>
+              </a:r>
+            </a:p>
+          </p:txBody>
+        </p:sp>
+        <p:sp>
+          <p:nvSpPr>
+            <p:cNvPr id="15" name="Rectangle 14"/>
             <p:cNvSpPr/>
             <p:nvPr/>
           </p:nvSpPr>
@@ -6427,7 +7882,38 @@
         </p:sp>
         <p:sp>
           <p:nvSpPr>
-            <p:cNvPr id="11" name="Rectangle 10"/>
+            <p:cNvPr id="16" name="TextBox 15"/>
+            <p:cNvSpPr txBox="1"/>
+            <p:nvPr/>
+          </p:nvSpPr>
+          <p:spPr>
+            <a:xfrm>
+              <a:off x="8312727" y="6400800"/>
+              <a:ext cx="2216727" cy="228600"/>
+            </a:xfrm>
+            <a:prstGeom prst="rect">
+              <a:avLst/>
+            </a:prstGeom>
+            <a:noFill/>
+          </p:spPr>
+          <p:txBody>
+            <a:bodyPr wrap="none">
+              <a:spAutoFit/>
+            </a:bodyPr>
+            <a:lstStyle/>
+            <a:p>
+              <a:pPr>
+                <a:defRPr sz="1200"/>
+              </a:pPr>
+              <a:r>
+                <a:t>chapter5</a:t>
+              </a:r>
+            </a:p>
+          </p:txBody>
+        </p:sp>
+        <p:sp>
+          <p:nvSpPr>
+            <p:cNvPr id="17" name="Rectangle 16"/>
             <p:cNvSpPr/>
             <p:nvPr/>
           </p:nvSpPr>
@@ -6545,10 +8031,10 @@
         </p:nvGrpSpPr>
         <p:grpSpPr>
           <a:xfrm>
-            <a:off x="0" y="6629400"/>
-            <a:ext cx="12191999" cy="228600"/>
-            <a:chOff x="0" y="6629400"/>
-            <a:chExt cx="12191999" cy="228600"/>
+            <a:off x="0" y="6400800"/>
+            <a:ext cx="12191999" cy="457200"/>
+            <a:chOff x="0" y="6400800"/>
+            <a:chExt cx="12191999" cy="457200"/>
           </a:xfrm>
         </p:grpSpPr>
         <p:sp>
@@ -6596,7 +8082,35 @@
         </p:sp>
         <p:sp>
           <p:nvSpPr>
-            <p:cNvPr id="6" name="Rectangle 5"/>
+            <p:cNvPr id="6" name="TextBox 5"/>
+            <p:cNvSpPr txBox="1"/>
+            <p:nvPr/>
+          </p:nvSpPr>
+          <p:spPr>
+            <a:xfrm>
+              <a:off x="0" y="6400800"/>
+              <a:ext cx="1108363" cy="228600"/>
+            </a:xfrm>
+            <a:prstGeom prst="rect">
+              <a:avLst/>
+            </a:prstGeom>
+            <a:noFill/>
+          </p:spPr>
+          <p:txBody>
+            <a:bodyPr wrap="none">
+              <a:spAutoFit/>
+            </a:bodyPr>
+            <a:lstStyle/>
+            <a:p>
+              <a:pPr>
+                <a:defRPr sz="1200"/>
+              </a:pPr>
+            </a:p>
+          </p:txBody>
+        </p:sp>
+        <p:sp>
+          <p:nvSpPr>
+            <p:cNvPr id="7" name="Rectangle 6"/>
             <p:cNvSpPr/>
             <p:nvPr/>
           </p:nvSpPr>
@@ -6714,10 +8228,10 @@
         </p:nvGrpSpPr>
         <p:grpSpPr>
           <a:xfrm>
-            <a:off x="0" y="6629400"/>
-            <a:ext cx="12191999" cy="228600"/>
-            <a:chOff x="0" y="6629400"/>
-            <a:chExt cx="12191999" cy="228600"/>
+            <a:off x="0" y="6400800"/>
+            <a:ext cx="12191999" cy="457200"/>
+            <a:chOff x="0" y="6400800"/>
+            <a:chExt cx="12191999" cy="457200"/>
           </a:xfrm>
         </p:grpSpPr>
         <p:sp>
@@ -6765,7 +8279,35 @@
         </p:sp>
         <p:sp>
           <p:nvSpPr>
-            <p:cNvPr id="6" name="Rectangle 5"/>
+            <p:cNvPr id="6" name="TextBox 5"/>
+            <p:cNvSpPr txBox="1"/>
+            <p:nvPr/>
+          </p:nvSpPr>
+          <p:spPr>
+            <a:xfrm>
+              <a:off x="0" y="6400800"/>
+              <a:ext cx="1108363" cy="228600"/>
+            </a:xfrm>
+            <a:prstGeom prst="rect">
+              <a:avLst/>
+            </a:prstGeom>
+            <a:noFill/>
+          </p:spPr>
+          <p:txBody>
+            <a:bodyPr wrap="none">
+              <a:spAutoFit/>
+            </a:bodyPr>
+            <a:lstStyle/>
+            <a:p>
+              <a:pPr>
+                <a:defRPr sz="1200"/>
+              </a:pPr>
+            </a:p>
+          </p:txBody>
+        </p:sp>
+        <p:sp>
+          <p:nvSpPr>
+            <p:cNvPr id="7" name="Rectangle 6"/>
             <p:cNvSpPr/>
             <p:nvPr/>
           </p:nvSpPr>
@@ -6808,7 +8350,38 @@
         </p:sp>
         <p:sp>
           <p:nvSpPr>
-            <p:cNvPr id="7" name="Rectangle 6"/>
+            <p:cNvPr id="8" name="TextBox 7"/>
+            <p:cNvSpPr txBox="1"/>
+            <p:nvPr/>
+          </p:nvSpPr>
+          <p:spPr>
+            <a:xfrm>
+              <a:off x="1108363" y="6400800"/>
+              <a:ext cx="1662545" cy="228600"/>
+            </a:xfrm>
+            <a:prstGeom prst="rect">
+              <a:avLst/>
+            </a:prstGeom>
+            <a:noFill/>
+          </p:spPr>
+          <p:txBody>
+            <a:bodyPr wrap="none">
+              <a:spAutoFit/>
+            </a:bodyPr>
+            <a:lstStyle/>
+            <a:p>
+              <a:pPr>
+                <a:defRPr sz="1200"/>
+              </a:pPr>
+              <a:r>
+                <a:t>chapter1</a:t>
+              </a:r>
+            </a:p>
+          </p:txBody>
+        </p:sp>
+        <p:sp>
+          <p:nvSpPr>
+            <p:cNvPr id="9" name="Rectangle 8"/>
             <p:cNvSpPr/>
             <p:nvPr/>
           </p:nvSpPr>
@@ -6851,7 +8424,38 @@
         </p:sp>
         <p:sp>
           <p:nvSpPr>
-            <p:cNvPr id="8" name="Rectangle 7"/>
+            <p:cNvPr id="10" name="TextBox 9"/>
+            <p:cNvSpPr txBox="1"/>
+            <p:nvPr/>
+          </p:nvSpPr>
+          <p:spPr>
+            <a:xfrm>
+              <a:off x="2770909" y="6400800"/>
+              <a:ext cx="2770909" cy="228600"/>
+            </a:xfrm>
+            <a:prstGeom prst="rect">
+              <a:avLst/>
+            </a:prstGeom>
+            <a:noFill/>
+          </p:spPr>
+          <p:txBody>
+            <a:bodyPr wrap="none">
+              <a:spAutoFit/>
+            </a:bodyPr>
+            <a:lstStyle/>
+            <a:p>
+              <a:pPr>
+                <a:defRPr sz="1200"/>
+              </a:pPr>
+              <a:r>
+                <a:t>chapter2</a:t>
+              </a:r>
+            </a:p>
+          </p:txBody>
+        </p:sp>
+        <p:sp>
+          <p:nvSpPr>
+            <p:cNvPr id="11" name="Rectangle 10"/>
             <p:cNvSpPr/>
             <p:nvPr/>
           </p:nvSpPr>
@@ -6894,7 +8498,38 @@
         </p:sp>
         <p:sp>
           <p:nvSpPr>
-            <p:cNvPr id="9" name="Rectangle 8"/>
+            <p:cNvPr id="12" name="TextBox 11"/>
+            <p:cNvSpPr txBox="1"/>
+            <p:nvPr/>
+          </p:nvSpPr>
+          <p:spPr>
+            <a:xfrm>
+              <a:off x="5541818" y="6400800"/>
+              <a:ext cx="2216727" cy="228600"/>
+            </a:xfrm>
+            <a:prstGeom prst="rect">
+              <a:avLst/>
+            </a:prstGeom>
+            <a:noFill/>
+          </p:spPr>
+          <p:txBody>
+            <a:bodyPr wrap="none">
+              <a:spAutoFit/>
+            </a:bodyPr>
+            <a:lstStyle/>
+            <a:p>
+              <a:pPr>
+                <a:defRPr sz="1200"/>
+              </a:pPr>
+              <a:r>
+                <a:t>chapter3</a:t>
+              </a:r>
+            </a:p>
+          </p:txBody>
+        </p:sp>
+        <p:sp>
+          <p:nvSpPr>
+            <p:cNvPr id="13" name="Rectangle 12"/>
             <p:cNvSpPr/>
             <p:nvPr/>
           </p:nvSpPr>
@@ -6937,7 +8572,38 @@
         </p:sp>
         <p:sp>
           <p:nvSpPr>
-            <p:cNvPr id="10" name="Rectangle 9"/>
+            <p:cNvPr id="14" name="TextBox 13"/>
+            <p:cNvSpPr txBox="1"/>
+            <p:nvPr/>
+          </p:nvSpPr>
+          <p:spPr>
+            <a:xfrm>
+              <a:off x="7758545" y="6400800"/>
+              <a:ext cx="554181" cy="228600"/>
+            </a:xfrm>
+            <a:prstGeom prst="rect">
+              <a:avLst/>
+            </a:prstGeom>
+            <a:noFill/>
+          </p:spPr>
+          <p:txBody>
+            <a:bodyPr wrap="none">
+              <a:spAutoFit/>
+            </a:bodyPr>
+            <a:lstStyle/>
+            <a:p>
+              <a:pPr>
+                <a:defRPr sz="1200"/>
+              </a:pPr>
+              <a:r>
+                <a:t>chapter4</a:t>
+              </a:r>
+            </a:p>
+          </p:txBody>
+        </p:sp>
+        <p:sp>
+          <p:nvSpPr>
+            <p:cNvPr id="15" name="Rectangle 14"/>
             <p:cNvSpPr/>
             <p:nvPr/>
           </p:nvSpPr>
@@ -6980,7 +8646,38 @@
         </p:sp>
         <p:sp>
           <p:nvSpPr>
-            <p:cNvPr id="11" name="Rectangle 10"/>
+            <p:cNvPr id="16" name="TextBox 15"/>
+            <p:cNvSpPr txBox="1"/>
+            <p:nvPr/>
+          </p:nvSpPr>
+          <p:spPr>
+            <a:xfrm>
+              <a:off x="8312727" y="6400800"/>
+              <a:ext cx="2770909" cy="228600"/>
+            </a:xfrm>
+            <a:prstGeom prst="rect">
+              <a:avLst/>
+            </a:prstGeom>
+            <a:noFill/>
+          </p:spPr>
+          <p:txBody>
+            <a:bodyPr wrap="none">
+              <a:spAutoFit/>
+            </a:bodyPr>
+            <a:lstStyle/>
+            <a:p>
+              <a:pPr>
+                <a:defRPr sz="1200"/>
+              </a:pPr>
+              <a:r>
+                <a:t>chapter5</a:t>
+              </a:r>
+            </a:p>
+          </p:txBody>
+        </p:sp>
+        <p:sp>
+          <p:nvSpPr>
+            <p:cNvPr id="17" name="Rectangle 16"/>
             <p:cNvSpPr/>
             <p:nvPr/>
           </p:nvSpPr>
@@ -7098,10 +8795,10 @@
         </p:nvGrpSpPr>
         <p:grpSpPr>
           <a:xfrm>
-            <a:off x="0" y="6629400"/>
-            <a:ext cx="12191999" cy="228600"/>
-            <a:chOff x="0" y="6629400"/>
-            <a:chExt cx="12191999" cy="228600"/>
+            <a:off x="0" y="6400800"/>
+            <a:ext cx="12191999" cy="457200"/>
+            <a:chOff x="0" y="6400800"/>
+            <a:chExt cx="12191999" cy="457200"/>
           </a:xfrm>
         </p:grpSpPr>
         <p:sp>
@@ -7149,7 +8846,35 @@
         </p:sp>
         <p:sp>
           <p:nvSpPr>
-            <p:cNvPr id="6" name="Rectangle 5"/>
+            <p:cNvPr id="6" name="TextBox 5"/>
+            <p:cNvSpPr txBox="1"/>
+            <p:nvPr/>
+          </p:nvSpPr>
+          <p:spPr>
+            <a:xfrm>
+              <a:off x="0" y="6400800"/>
+              <a:ext cx="1108363" cy="228600"/>
+            </a:xfrm>
+            <a:prstGeom prst="rect">
+              <a:avLst/>
+            </a:prstGeom>
+            <a:noFill/>
+          </p:spPr>
+          <p:txBody>
+            <a:bodyPr wrap="none">
+              <a:spAutoFit/>
+            </a:bodyPr>
+            <a:lstStyle/>
+            <a:p>
+              <a:pPr>
+                <a:defRPr sz="1200"/>
+              </a:pPr>
+            </a:p>
+          </p:txBody>
+        </p:sp>
+        <p:sp>
+          <p:nvSpPr>
+            <p:cNvPr id="7" name="Rectangle 6"/>
             <p:cNvSpPr/>
             <p:nvPr/>
           </p:nvSpPr>
@@ -7192,7 +8917,38 @@
         </p:sp>
         <p:sp>
           <p:nvSpPr>
-            <p:cNvPr id="7" name="Rectangle 6"/>
+            <p:cNvPr id="8" name="TextBox 7"/>
+            <p:cNvSpPr txBox="1"/>
+            <p:nvPr/>
+          </p:nvSpPr>
+          <p:spPr>
+            <a:xfrm>
+              <a:off x="1108363" y="6400800"/>
+              <a:ext cx="1662545" cy="228600"/>
+            </a:xfrm>
+            <a:prstGeom prst="rect">
+              <a:avLst/>
+            </a:prstGeom>
+            <a:noFill/>
+          </p:spPr>
+          <p:txBody>
+            <a:bodyPr wrap="none">
+              <a:spAutoFit/>
+            </a:bodyPr>
+            <a:lstStyle/>
+            <a:p>
+              <a:pPr>
+                <a:defRPr sz="1200"/>
+              </a:pPr>
+              <a:r>
+                <a:t>chapter1</a:t>
+              </a:r>
+            </a:p>
+          </p:txBody>
+        </p:sp>
+        <p:sp>
+          <p:nvSpPr>
+            <p:cNvPr id="9" name="Rectangle 8"/>
             <p:cNvSpPr/>
             <p:nvPr/>
           </p:nvSpPr>
@@ -7235,7 +8991,38 @@
         </p:sp>
         <p:sp>
           <p:nvSpPr>
-            <p:cNvPr id="8" name="Rectangle 7"/>
+            <p:cNvPr id="10" name="TextBox 9"/>
+            <p:cNvSpPr txBox="1"/>
+            <p:nvPr/>
+          </p:nvSpPr>
+          <p:spPr>
+            <a:xfrm>
+              <a:off x="2770909" y="6400800"/>
+              <a:ext cx="2770909" cy="228600"/>
+            </a:xfrm>
+            <a:prstGeom prst="rect">
+              <a:avLst/>
+            </a:prstGeom>
+            <a:noFill/>
+          </p:spPr>
+          <p:txBody>
+            <a:bodyPr wrap="none">
+              <a:spAutoFit/>
+            </a:bodyPr>
+            <a:lstStyle/>
+            <a:p>
+              <a:pPr>
+                <a:defRPr sz="1200"/>
+              </a:pPr>
+              <a:r>
+                <a:t>chapter2</a:t>
+              </a:r>
+            </a:p>
+          </p:txBody>
+        </p:sp>
+        <p:sp>
+          <p:nvSpPr>
+            <p:cNvPr id="11" name="Rectangle 10"/>
             <p:cNvSpPr/>
             <p:nvPr/>
           </p:nvSpPr>
@@ -7278,7 +9065,38 @@
         </p:sp>
         <p:sp>
           <p:nvSpPr>
-            <p:cNvPr id="9" name="Rectangle 8"/>
+            <p:cNvPr id="12" name="TextBox 11"/>
+            <p:cNvSpPr txBox="1"/>
+            <p:nvPr/>
+          </p:nvSpPr>
+          <p:spPr>
+            <a:xfrm>
+              <a:off x="5541818" y="6400800"/>
+              <a:ext cx="2216727" cy="228600"/>
+            </a:xfrm>
+            <a:prstGeom prst="rect">
+              <a:avLst/>
+            </a:prstGeom>
+            <a:noFill/>
+          </p:spPr>
+          <p:txBody>
+            <a:bodyPr wrap="none">
+              <a:spAutoFit/>
+            </a:bodyPr>
+            <a:lstStyle/>
+            <a:p>
+              <a:pPr>
+                <a:defRPr sz="1200"/>
+              </a:pPr>
+              <a:r>
+                <a:t>chapter3</a:t>
+              </a:r>
+            </a:p>
+          </p:txBody>
+        </p:sp>
+        <p:sp>
+          <p:nvSpPr>
+            <p:cNvPr id="13" name="Rectangle 12"/>
             <p:cNvSpPr/>
             <p:nvPr/>
           </p:nvSpPr>
@@ -7321,7 +9139,38 @@
         </p:sp>
         <p:sp>
           <p:nvSpPr>
-            <p:cNvPr id="10" name="Rectangle 9"/>
+            <p:cNvPr id="14" name="TextBox 13"/>
+            <p:cNvSpPr txBox="1"/>
+            <p:nvPr/>
+          </p:nvSpPr>
+          <p:spPr>
+            <a:xfrm>
+              <a:off x="7758545" y="6400800"/>
+              <a:ext cx="554181" cy="228600"/>
+            </a:xfrm>
+            <a:prstGeom prst="rect">
+              <a:avLst/>
+            </a:prstGeom>
+            <a:noFill/>
+          </p:spPr>
+          <p:txBody>
+            <a:bodyPr wrap="none">
+              <a:spAutoFit/>
+            </a:bodyPr>
+            <a:lstStyle/>
+            <a:p>
+              <a:pPr>
+                <a:defRPr sz="1200"/>
+              </a:pPr>
+              <a:r>
+                <a:t>chapter4</a:t>
+              </a:r>
+            </a:p>
+          </p:txBody>
+        </p:sp>
+        <p:sp>
+          <p:nvSpPr>
+            <p:cNvPr id="15" name="Rectangle 14"/>
             <p:cNvSpPr/>
             <p:nvPr/>
           </p:nvSpPr>
@@ -7364,7 +9213,38 @@
         </p:sp>
         <p:sp>
           <p:nvSpPr>
-            <p:cNvPr id="11" name="Rectangle 10"/>
+            <p:cNvPr id="16" name="TextBox 15"/>
+            <p:cNvSpPr txBox="1"/>
+            <p:nvPr/>
+          </p:nvSpPr>
+          <p:spPr>
+            <a:xfrm>
+              <a:off x="8312727" y="6400800"/>
+              <a:ext cx="3325090" cy="228600"/>
+            </a:xfrm>
+            <a:prstGeom prst="rect">
+              <a:avLst/>
+            </a:prstGeom>
+            <a:noFill/>
+          </p:spPr>
+          <p:txBody>
+            <a:bodyPr wrap="none">
+              <a:spAutoFit/>
+            </a:bodyPr>
+            <a:lstStyle/>
+            <a:p>
+              <a:pPr>
+                <a:defRPr sz="1200"/>
+              </a:pPr>
+              <a:r>
+                <a:t>chapter5</a:t>
+              </a:r>
+            </a:p>
+          </p:txBody>
+        </p:sp>
+        <p:sp>
+          <p:nvSpPr>
+            <p:cNvPr id="17" name="Rectangle 16"/>
             <p:cNvSpPr/>
             <p:nvPr/>
           </p:nvSpPr>
@@ -7416,6 +9296,13 @@
   <p:clrMapOvr>
     <a:masterClrMapping/>
   </p:clrMapOvr>
+  <p:timing>
+    <p:tnLst>
+      <p:par>
+        <p:cTn id="1" dur="indefinite" restart="never" nodeType="tmRoot"/>
+      </p:par>
+    </p:tnLst>
+  </p:timing>
 </p:sld>
 </file>
 
@@ -7452,7 +9339,7 @@
           <a:lstStyle/>
           <a:p>
             <a:r>
-              <a:rPr lang="en-US" altLang="zh-CN" smtClean="0"/>
+              <a:rPr lang="en-US" altLang="zh-CN" dirty="0" smtClean="0"/>
               <a:t>Thanks!</a:t>
             </a:r>
             <a:endParaRPr lang="zh-CN" altLang="en-US" dirty="0"/>
@@ -7486,10 +9373,10 @@
         </p:nvGrpSpPr>
         <p:grpSpPr>
           <a:xfrm>
-            <a:off x="0" y="6629400"/>
-            <a:ext cx="12192000" cy="228600"/>
-            <a:chOff x="0" y="6629400"/>
-            <a:chExt cx="12192000" cy="228600"/>
+            <a:off x="0" y="6400800"/>
+            <a:ext cx="12192000" cy="457200"/>
+            <a:chOff x="0" y="6400800"/>
+            <a:chExt cx="12192000" cy="457200"/>
           </a:xfrm>
         </p:grpSpPr>
         <p:sp>
@@ -7537,7 +9424,35 @@
         </p:sp>
         <p:sp>
           <p:nvSpPr>
-            <p:cNvPr id="15" name="Rectangle 14"/>
+            <p:cNvPr id="15" name="TextBox 14"/>
+            <p:cNvSpPr txBox="1"/>
+            <p:nvPr/>
+          </p:nvSpPr>
+          <p:spPr>
+            <a:xfrm>
+              <a:off x="0" y="6400800"/>
+              <a:ext cx="1108363" cy="228600"/>
+            </a:xfrm>
+            <a:prstGeom prst="rect">
+              <a:avLst/>
+            </a:prstGeom>
+            <a:noFill/>
+          </p:spPr>
+          <p:txBody>
+            <a:bodyPr wrap="none">
+              <a:spAutoFit/>
+            </a:bodyPr>
+            <a:lstStyle/>
+            <a:p>
+              <a:pPr>
+                <a:defRPr sz="1200"/>
+              </a:pPr>
+            </a:p>
+          </p:txBody>
+        </p:sp>
+        <p:sp>
+          <p:nvSpPr>
+            <p:cNvPr id="16" name="Rectangle 15"/>
             <p:cNvSpPr/>
             <p:nvPr/>
           </p:nvSpPr>
@@ -7580,7 +9495,38 @@
         </p:sp>
         <p:sp>
           <p:nvSpPr>
-            <p:cNvPr id="16" name="Rectangle 15"/>
+            <p:cNvPr id="17" name="TextBox 16"/>
+            <p:cNvSpPr txBox="1"/>
+            <p:nvPr/>
+          </p:nvSpPr>
+          <p:spPr>
+            <a:xfrm>
+              <a:off x="1108363" y="6400800"/>
+              <a:ext cx="1662545" cy="228600"/>
+            </a:xfrm>
+            <a:prstGeom prst="rect">
+              <a:avLst/>
+            </a:prstGeom>
+            <a:noFill/>
+          </p:spPr>
+          <p:txBody>
+            <a:bodyPr wrap="none">
+              <a:spAutoFit/>
+            </a:bodyPr>
+            <a:lstStyle/>
+            <a:p>
+              <a:pPr>
+                <a:defRPr sz="1200"/>
+              </a:pPr>
+              <a:r>
+                <a:t>chapter1</a:t>
+              </a:r>
+            </a:p>
+          </p:txBody>
+        </p:sp>
+        <p:sp>
+          <p:nvSpPr>
+            <p:cNvPr id="18" name="Rectangle 17"/>
             <p:cNvSpPr/>
             <p:nvPr/>
           </p:nvSpPr>
@@ -7623,7 +9569,38 @@
         </p:sp>
         <p:sp>
           <p:nvSpPr>
-            <p:cNvPr id="17" name="Rectangle 16"/>
+            <p:cNvPr id="19" name="TextBox 18"/>
+            <p:cNvSpPr txBox="1"/>
+            <p:nvPr/>
+          </p:nvSpPr>
+          <p:spPr>
+            <a:xfrm>
+              <a:off x="2770909" y="6400800"/>
+              <a:ext cx="2770909" cy="228600"/>
+            </a:xfrm>
+            <a:prstGeom prst="rect">
+              <a:avLst/>
+            </a:prstGeom>
+            <a:noFill/>
+          </p:spPr>
+          <p:txBody>
+            <a:bodyPr wrap="none">
+              <a:spAutoFit/>
+            </a:bodyPr>
+            <a:lstStyle/>
+            <a:p>
+              <a:pPr>
+                <a:defRPr sz="1200"/>
+              </a:pPr>
+              <a:r>
+                <a:t>chapter2</a:t>
+              </a:r>
+            </a:p>
+          </p:txBody>
+        </p:sp>
+        <p:sp>
+          <p:nvSpPr>
+            <p:cNvPr id="20" name="Rectangle 19"/>
             <p:cNvSpPr/>
             <p:nvPr/>
           </p:nvSpPr>
@@ -7666,7 +9643,38 @@
         </p:sp>
         <p:sp>
           <p:nvSpPr>
-            <p:cNvPr id="18" name="Rectangle 17"/>
+            <p:cNvPr id="21" name="TextBox 20"/>
+            <p:cNvSpPr txBox="1"/>
+            <p:nvPr/>
+          </p:nvSpPr>
+          <p:spPr>
+            <a:xfrm>
+              <a:off x="5541818" y="6400800"/>
+              <a:ext cx="2216727" cy="228600"/>
+            </a:xfrm>
+            <a:prstGeom prst="rect">
+              <a:avLst/>
+            </a:prstGeom>
+            <a:noFill/>
+          </p:spPr>
+          <p:txBody>
+            <a:bodyPr wrap="none">
+              <a:spAutoFit/>
+            </a:bodyPr>
+            <a:lstStyle/>
+            <a:p>
+              <a:pPr>
+                <a:defRPr sz="1200"/>
+              </a:pPr>
+              <a:r>
+                <a:t>chapter3</a:t>
+              </a:r>
+            </a:p>
+          </p:txBody>
+        </p:sp>
+        <p:sp>
+          <p:nvSpPr>
+            <p:cNvPr id="22" name="Rectangle 21"/>
             <p:cNvSpPr/>
             <p:nvPr/>
           </p:nvSpPr>
@@ -7709,7 +9717,38 @@
         </p:sp>
         <p:sp>
           <p:nvSpPr>
-            <p:cNvPr id="19" name="Rectangle 18"/>
+            <p:cNvPr id="23" name="TextBox 22"/>
+            <p:cNvSpPr txBox="1"/>
+            <p:nvPr/>
+          </p:nvSpPr>
+          <p:spPr>
+            <a:xfrm>
+              <a:off x="7758545" y="6400800"/>
+              <a:ext cx="554181" cy="228600"/>
+            </a:xfrm>
+            <a:prstGeom prst="rect">
+              <a:avLst/>
+            </a:prstGeom>
+            <a:noFill/>
+          </p:spPr>
+          <p:txBody>
+            <a:bodyPr wrap="none">
+              <a:spAutoFit/>
+            </a:bodyPr>
+            <a:lstStyle/>
+            <a:p>
+              <a:pPr>
+                <a:defRPr sz="1200"/>
+              </a:pPr>
+              <a:r>
+                <a:t>chapter4</a:t>
+              </a:r>
+            </a:p>
+          </p:txBody>
+        </p:sp>
+        <p:sp>
+          <p:nvSpPr>
+            <p:cNvPr id="24" name="Rectangle 23"/>
             <p:cNvSpPr/>
             <p:nvPr/>
           </p:nvSpPr>
@@ -7752,7 +9791,38 @@
         </p:sp>
         <p:sp>
           <p:nvSpPr>
-            <p:cNvPr id="20" name="Rectangle 19"/>
+            <p:cNvPr id="25" name="TextBox 24"/>
+            <p:cNvSpPr txBox="1"/>
+            <p:nvPr/>
+          </p:nvSpPr>
+          <p:spPr>
+            <a:xfrm>
+              <a:off x="8312727" y="6400800"/>
+              <a:ext cx="3325090" cy="228600"/>
+            </a:xfrm>
+            <a:prstGeom prst="rect">
+              <a:avLst/>
+            </a:prstGeom>
+            <a:noFill/>
+          </p:spPr>
+          <p:txBody>
+            <a:bodyPr wrap="none">
+              <a:spAutoFit/>
+            </a:bodyPr>
+            <a:lstStyle/>
+            <a:p>
+              <a:pPr>
+                <a:defRPr sz="1200"/>
+              </a:pPr>
+              <a:r>
+                <a:t>chapter5</a:t>
+              </a:r>
+            </a:p>
+          </p:txBody>
+        </p:sp>
+        <p:sp>
+          <p:nvSpPr>
+            <p:cNvPr id="26" name="Rectangle 25"/>
             <p:cNvSpPr/>
             <p:nvPr/>
           </p:nvSpPr>
@@ -7795,7 +9865,38 @@
         </p:sp>
         <p:sp>
           <p:nvSpPr>
-            <p:cNvPr id="21" name="Rectangle 20"/>
+            <p:cNvPr id="27" name="TextBox 26"/>
+            <p:cNvSpPr txBox="1"/>
+            <p:nvPr/>
+          </p:nvSpPr>
+          <p:spPr>
+            <a:xfrm>
+              <a:off x="11637818" y="6400800"/>
+              <a:ext cx="554181" cy="228600"/>
+            </a:xfrm>
+            <a:prstGeom prst="rect">
+              <a:avLst/>
+            </a:prstGeom>
+            <a:noFill/>
+          </p:spPr>
+          <p:txBody>
+            <a:bodyPr wrap="none">
+              <a:spAutoFit/>
+            </a:bodyPr>
+            <a:lstStyle/>
+            <a:p>
+              <a:pPr>
+                <a:defRPr sz="1200"/>
+              </a:pPr>
+              <a:r>
+                <a:t>Thanks!</a:t>
+              </a:r>
+            </a:p>
+          </p:txBody>
+        </p:sp>
+        <p:sp>
+          <p:nvSpPr>
+            <p:cNvPr id="28" name="Rectangle 27"/>
             <p:cNvSpPr/>
             <p:nvPr/>
           </p:nvSpPr>
@@ -7847,6 +9948,13 @@
   <p:clrMapOvr>
     <a:masterClrMapping/>
   </p:clrMapOvr>
+  <p:timing>
+    <p:tnLst>
+      <p:par>
+        <p:cTn id="1" dur="indefinite" restart="never" nodeType="tmRoot"/>
+      </p:par>
+    </p:tnLst>
+  </p:timing>
 </p:sld>
 </file>
 
@@ -7917,10 +10025,10 @@
         </p:nvGrpSpPr>
         <p:grpSpPr>
           <a:xfrm>
-            <a:off x="0" y="6629400"/>
-            <a:ext cx="12191999" cy="228600"/>
-            <a:chOff x="0" y="6629400"/>
-            <a:chExt cx="12191999" cy="228600"/>
+            <a:off x="0" y="6400800"/>
+            <a:ext cx="12191999" cy="457200"/>
+            <a:chOff x="0" y="6400800"/>
+            <a:chExt cx="12191999" cy="457200"/>
           </a:xfrm>
         </p:grpSpPr>
         <p:sp>
@@ -7968,7 +10076,35 @@
         </p:sp>
         <p:sp>
           <p:nvSpPr>
-            <p:cNvPr id="7" name="Rectangle 6"/>
+            <p:cNvPr id="7" name="TextBox 6"/>
+            <p:cNvSpPr txBox="1"/>
+            <p:nvPr/>
+          </p:nvSpPr>
+          <p:spPr>
+            <a:xfrm>
+              <a:off x="0" y="6400800"/>
+              <a:ext cx="1108363" cy="228600"/>
+            </a:xfrm>
+            <a:prstGeom prst="rect">
+              <a:avLst/>
+            </a:prstGeom>
+            <a:noFill/>
+          </p:spPr>
+          <p:txBody>
+            <a:bodyPr wrap="none">
+              <a:spAutoFit/>
+            </a:bodyPr>
+            <a:lstStyle/>
+            <a:p>
+              <a:pPr>
+                <a:defRPr sz="1200"/>
+              </a:pPr>
+            </a:p>
+          </p:txBody>
+        </p:sp>
+        <p:sp>
+          <p:nvSpPr>
+            <p:cNvPr id="8" name="Rectangle 7"/>
             <p:cNvSpPr/>
             <p:nvPr/>
           </p:nvSpPr>
@@ -8011,7 +10147,38 @@
         </p:sp>
         <p:sp>
           <p:nvSpPr>
-            <p:cNvPr id="8" name="Rectangle 7"/>
+            <p:cNvPr id="9" name="TextBox 8"/>
+            <p:cNvSpPr txBox="1"/>
+            <p:nvPr/>
+          </p:nvSpPr>
+          <p:spPr>
+            <a:xfrm>
+              <a:off x="1108363" y="6400800"/>
+              <a:ext cx="554181" cy="228600"/>
+            </a:xfrm>
+            <a:prstGeom prst="rect">
+              <a:avLst/>
+            </a:prstGeom>
+            <a:noFill/>
+          </p:spPr>
+          <p:txBody>
+            <a:bodyPr wrap="none">
+              <a:spAutoFit/>
+            </a:bodyPr>
+            <a:lstStyle/>
+            <a:p>
+              <a:pPr>
+                <a:defRPr sz="1200"/>
+              </a:pPr>
+              <a:r>
+                <a:t>chapter1</a:t>
+              </a:r>
+            </a:p>
+          </p:txBody>
+        </p:sp>
+        <p:sp>
+          <p:nvSpPr>
+            <p:cNvPr id="10" name="Rectangle 9"/>
             <p:cNvSpPr/>
             <p:nvPr/>
           </p:nvSpPr>
@@ -8129,10 +10296,10 @@
         </p:nvGrpSpPr>
         <p:grpSpPr>
           <a:xfrm>
-            <a:off x="0" y="6629400"/>
-            <a:ext cx="12191999" cy="228600"/>
-            <a:chOff x="0" y="6629400"/>
-            <a:chExt cx="12191999" cy="228600"/>
+            <a:off x="0" y="6400800"/>
+            <a:ext cx="12191999" cy="457200"/>
+            <a:chOff x="0" y="6400800"/>
+            <a:chExt cx="12191999" cy="457200"/>
           </a:xfrm>
         </p:grpSpPr>
         <p:sp>
@@ -8180,7 +10347,35 @@
         </p:sp>
         <p:sp>
           <p:nvSpPr>
-            <p:cNvPr id="6" name="Rectangle 5"/>
+            <p:cNvPr id="6" name="TextBox 5"/>
+            <p:cNvSpPr txBox="1"/>
+            <p:nvPr/>
+          </p:nvSpPr>
+          <p:spPr>
+            <a:xfrm>
+              <a:off x="0" y="6400800"/>
+              <a:ext cx="1108363" cy="228600"/>
+            </a:xfrm>
+            <a:prstGeom prst="rect">
+              <a:avLst/>
+            </a:prstGeom>
+            <a:noFill/>
+          </p:spPr>
+          <p:txBody>
+            <a:bodyPr wrap="none">
+              <a:spAutoFit/>
+            </a:bodyPr>
+            <a:lstStyle/>
+            <a:p>
+              <a:pPr>
+                <a:defRPr sz="1200"/>
+              </a:pPr>
+            </a:p>
+          </p:txBody>
+        </p:sp>
+        <p:sp>
+          <p:nvSpPr>
+            <p:cNvPr id="7" name="Rectangle 6"/>
             <p:cNvSpPr/>
             <p:nvPr/>
           </p:nvSpPr>
@@ -8223,7 +10418,38 @@
         </p:sp>
         <p:sp>
           <p:nvSpPr>
-            <p:cNvPr id="7" name="Rectangle 6"/>
+            <p:cNvPr id="8" name="TextBox 7"/>
+            <p:cNvSpPr txBox="1"/>
+            <p:nvPr/>
+          </p:nvSpPr>
+          <p:spPr>
+            <a:xfrm>
+              <a:off x="1108363" y="6400800"/>
+              <a:ext cx="1108363" cy="228600"/>
+            </a:xfrm>
+            <a:prstGeom prst="rect">
+              <a:avLst/>
+            </a:prstGeom>
+            <a:noFill/>
+          </p:spPr>
+          <p:txBody>
+            <a:bodyPr wrap="none">
+              <a:spAutoFit/>
+            </a:bodyPr>
+            <a:lstStyle/>
+            <a:p>
+              <a:pPr>
+                <a:defRPr sz="1200"/>
+              </a:pPr>
+              <a:r>
+                <a:t>chapter1</a:t>
+              </a:r>
+            </a:p>
+          </p:txBody>
+        </p:sp>
+        <p:sp>
+          <p:nvSpPr>
+            <p:cNvPr id="9" name="Rectangle 8"/>
             <p:cNvSpPr/>
             <p:nvPr/>
           </p:nvSpPr>
@@ -8341,10 +10567,10 @@
         </p:nvGrpSpPr>
         <p:grpSpPr>
           <a:xfrm>
-            <a:off x="0" y="6629400"/>
-            <a:ext cx="12191999" cy="228600"/>
-            <a:chOff x="0" y="6629400"/>
-            <a:chExt cx="12191999" cy="228600"/>
+            <a:off x="0" y="6400800"/>
+            <a:ext cx="12191999" cy="457200"/>
+            <a:chOff x="0" y="6400800"/>
+            <a:chExt cx="12191999" cy="457200"/>
           </a:xfrm>
         </p:grpSpPr>
         <p:sp>
@@ -8392,7 +10618,35 @@
         </p:sp>
         <p:sp>
           <p:nvSpPr>
-            <p:cNvPr id="6" name="Rectangle 5"/>
+            <p:cNvPr id="6" name="TextBox 5"/>
+            <p:cNvSpPr txBox="1"/>
+            <p:nvPr/>
+          </p:nvSpPr>
+          <p:spPr>
+            <a:xfrm>
+              <a:off x="0" y="6400800"/>
+              <a:ext cx="1108363" cy="228600"/>
+            </a:xfrm>
+            <a:prstGeom prst="rect">
+              <a:avLst/>
+            </a:prstGeom>
+            <a:noFill/>
+          </p:spPr>
+          <p:txBody>
+            <a:bodyPr wrap="none">
+              <a:spAutoFit/>
+            </a:bodyPr>
+            <a:lstStyle/>
+            <a:p>
+              <a:pPr>
+                <a:defRPr sz="1200"/>
+              </a:pPr>
+            </a:p>
+          </p:txBody>
+        </p:sp>
+        <p:sp>
+          <p:nvSpPr>
+            <p:cNvPr id="7" name="Rectangle 6"/>
             <p:cNvSpPr/>
             <p:nvPr/>
           </p:nvSpPr>
@@ -8435,7 +10689,38 @@
         </p:sp>
         <p:sp>
           <p:nvSpPr>
-            <p:cNvPr id="7" name="Rectangle 6"/>
+            <p:cNvPr id="8" name="TextBox 7"/>
+            <p:cNvSpPr txBox="1"/>
+            <p:nvPr/>
+          </p:nvSpPr>
+          <p:spPr>
+            <a:xfrm>
+              <a:off x="1108363" y="6400800"/>
+              <a:ext cx="1662545" cy="228600"/>
+            </a:xfrm>
+            <a:prstGeom prst="rect">
+              <a:avLst/>
+            </a:prstGeom>
+            <a:noFill/>
+          </p:spPr>
+          <p:txBody>
+            <a:bodyPr wrap="none">
+              <a:spAutoFit/>
+            </a:bodyPr>
+            <a:lstStyle/>
+            <a:p>
+              <a:pPr>
+                <a:defRPr sz="1200"/>
+              </a:pPr>
+              <a:r>
+                <a:t>chapter1</a:t>
+              </a:r>
+            </a:p>
+          </p:txBody>
+        </p:sp>
+        <p:sp>
+          <p:nvSpPr>
+            <p:cNvPr id="9" name="Rectangle 8"/>
             <p:cNvSpPr/>
             <p:nvPr/>
           </p:nvSpPr>
@@ -8557,10 +10842,10 @@
         </p:nvGrpSpPr>
         <p:grpSpPr>
           <a:xfrm>
-            <a:off x="0" y="6629400"/>
-            <a:ext cx="12191999" cy="228600"/>
-            <a:chOff x="0" y="6629400"/>
-            <a:chExt cx="12191999" cy="228600"/>
+            <a:off x="0" y="6400800"/>
+            <a:ext cx="12191999" cy="457200"/>
+            <a:chOff x="0" y="6400800"/>
+            <a:chExt cx="12191999" cy="457200"/>
           </a:xfrm>
         </p:grpSpPr>
         <p:sp>
@@ -8608,7 +10893,35 @@
         </p:sp>
         <p:sp>
           <p:nvSpPr>
-            <p:cNvPr id="7" name="Rectangle 6"/>
+            <p:cNvPr id="7" name="TextBox 6"/>
+            <p:cNvSpPr txBox="1"/>
+            <p:nvPr/>
+          </p:nvSpPr>
+          <p:spPr>
+            <a:xfrm>
+              <a:off x="0" y="6400800"/>
+              <a:ext cx="1108363" cy="228600"/>
+            </a:xfrm>
+            <a:prstGeom prst="rect">
+              <a:avLst/>
+            </a:prstGeom>
+            <a:noFill/>
+          </p:spPr>
+          <p:txBody>
+            <a:bodyPr wrap="none">
+              <a:spAutoFit/>
+            </a:bodyPr>
+            <a:lstStyle/>
+            <a:p>
+              <a:pPr>
+                <a:defRPr sz="1200"/>
+              </a:pPr>
+            </a:p>
+          </p:txBody>
+        </p:sp>
+        <p:sp>
+          <p:nvSpPr>
+            <p:cNvPr id="8" name="Rectangle 7"/>
             <p:cNvSpPr/>
             <p:nvPr/>
           </p:nvSpPr>
@@ -8651,7 +10964,38 @@
         </p:sp>
         <p:sp>
           <p:nvSpPr>
-            <p:cNvPr id="8" name="Rectangle 7"/>
+            <p:cNvPr id="9" name="TextBox 8"/>
+            <p:cNvSpPr txBox="1"/>
+            <p:nvPr/>
+          </p:nvSpPr>
+          <p:spPr>
+            <a:xfrm>
+              <a:off x="1108363" y="6400800"/>
+              <a:ext cx="1662545" cy="228600"/>
+            </a:xfrm>
+            <a:prstGeom prst="rect">
+              <a:avLst/>
+            </a:prstGeom>
+            <a:noFill/>
+          </p:spPr>
+          <p:txBody>
+            <a:bodyPr wrap="none">
+              <a:spAutoFit/>
+            </a:bodyPr>
+            <a:lstStyle/>
+            <a:p>
+              <a:pPr>
+                <a:defRPr sz="1200"/>
+              </a:pPr>
+              <a:r>
+                <a:t>chapter1</a:t>
+              </a:r>
+            </a:p>
+          </p:txBody>
+        </p:sp>
+        <p:sp>
+          <p:nvSpPr>
+            <p:cNvPr id="10" name="Rectangle 9"/>
             <p:cNvSpPr/>
             <p:nvPr/>
           </p:nvSpPr>
@@ -8694,7 +11038,38 @@
         </p:sp>
         <p:sp>
           <p:nvSpPr>
-            <p:cNvPr id="9" name="Rectangle 8"/>
+            <p:cNvPr id="11" name="TextBox 10"/>
+            <p:cNvSpPr txBox="1"/>
+            <p:nvPr/>
+          </p:nvSpPr>
+          <p:spPr>
+            <a:xfrm>
+              <a:off x="2770909" y="6400800"/>
+              <a:ext cx="554181" cy="228600"/>
+            </a:xfrm>
+            <a:prstGeom prst="rect">
+              <a:avLst/>
+            </a:prstGeom>
+            <a:noFill/>
+          </p:spPr>
+          <p:txBody>
+            <a:bodyPr wrap="none">
+              <a:spAutoFit/>
+            </a:bodyPr>
+            <a:lstStyle/>
+            <a:p>
+              <a:pPr>
+                <a:defRPr sz="1200"/>
+              </a:pPr>
+              <a:r>
+                <a:t>chapter2</a:t>
+              </a:r>
+            </a:p>
+          </p:txBody>
+        </p:sp>
+        <p:sp>
+          <p:nvSpPr>
+            <p:cNvPr id="12" name="Rectangle 11"/>
             <p:cNvSpPr/>
             <p:nvPr/>
           </p:nvSpPr>
@@ -8812,10 +11187,10 @@
         </p:nvGrpSpPr>
         <p:grpSpPr>
           <a:xfrm>
-            <a:off x="0" y="6629400"/>
-            <a:ext cx="12191999" cy="228600"/>
-            <a:chOff x="0" y="6629400"/>
-            <a:chExt cx="12191999" cy="228600"/>
+            <a:off x="0" y="6400800"/>
+            <a:ext cx="12191999" cy="457200"/>
+            <a:chOff x="0" y="6400800"/>
+            <a:chExt cx="12191999" cy="457200"/>
           </a:xfrm>
         </p:grpSpPr>
         <p:sp>
@@ -8863,7 +11238,35 @@
         </p:sp>
         <p:sp>
           <p:nvSpPr>
-            <p:cNvPr id="6" name="Rectangle 5"/>
+            <p:cNvPr id="6" name="TextBox 5"/>
+            <p:cNvSpPr txBox="1"/>
+            <p:nvPr/>
+          </p:nvSpPr>
+          <p:spPr>
+            <a:xfrm>
+              <a:off x="0" y="6400800"/>
+              <a:ext cx="1108363" cy="228600"/>
+            </a:xfrm>
+            <a:prstGeom prst="rect">
+              <a:avLst/>
+            </a:prstGeom>
+            <a:noFill/>
+          </p:spPr>
+          <p:txBody>
+            <a:bodyPr wrap="none">
+              <a:spAutoFit/>
+            </a:bodyPr>
+            <a:lstStyle/>
+            <a:p>
+              <a:pPr>
+                <a:defRPr sz="1200"/>
+              </a:pPr>
+            </a:p>
+          </p:txBody>
+        </p:sp>
+        <p:sp>
+          <p:nvSpPr>
+            <p:cNvPr id="7" name="Rectangle 6"/>
             <p:cNvSpPr/>
             <p:nvPr/>
           </p:nvSpPr>
@@ -8906,7 +11309,38 @@
         </p:sp>
         <p:sp>
           <p:nvSpPr>
-            <p:cNvPr id="7" name="Rectangle 6"/>
+            <p:cNvPr id="8" name="TextBox 7"/>
+            <p:cNvSpPr txBox="1"/>
+            <p:nvPr/>
+          </p:nvSpPr>
+          <p:spPr>
+            <a:xfrm>
+              <a:off x="1108363" y="6400800"/>
+              <a:ext cx="1662545" cy="228600"/>
+            </a:xfrm>
+            <a:prstGeom prst="rect">
+              <a:avLst/>
+            </a:prstGeom>
+            <a:noFill/>
+          </p:spPr>
+          <p:txBody>
+            <a:bodyPr wrap="none">
+              <a:spAutoFit/>
+            </a:bodyPr>
+            <a:lstStyle/>
+            <a:p>
+              <a:pPr>
+                <a:defRPr sz="1200"/>
+              </a:pPr>
+              <a:r>
+                <a:t>chapter1</a:t>
+              </a:r>
+            </a:p>
+          </p:txBody>
+        </p:sp>
+        <p:sp>
+          <p:nvSpPr>
+            <p:cNvPr id="9" name="Rectangle 8"/>
             <p:cNvSpPr/>
             <p:nvPr/>
           </p:nvSpPr>
@@ -8949,7 +11383,38 @@
         </p:sp>
         <p:sp>
           <p:nvSpPr>
-            <p:cNvPr id="8" name="Rectangle 7"/>
+            <p:cNvPr id="10" name="TextBox 9"/>
+            <p:cNvSpPr txBox="1"/>
+            <p:nvPr/>
+          </p:nvSpPr>
+          <p:spPr>
+            <a:xfrm>
+              <a:off x="2770909" y="6400800"/>
+              <a:ext cx="1108363" cy="228600"/>
+            </a:xfrm>
+            <a:prstGeom prst="rect">
+              <a:avLst/>
+            </a:prstGeom>
+            <a:noFill/>
+          </p:spPr>
+          <p:txBody>
+            <a:bodyPr wrap="none">
+              <a:spAutoFit/>
+            </a:bodyPr>
+            <a:lstStyle/>
+            <a:p>
+              <a:pPr>
+                <a:defRPr sz="1200"/>
+              </a:pPr>
+              <a:r>
+                <a:t>chapter2</a:t>
+              </a:r>
+            </a:p>
+          </p:txBody>
+        </p:sp>
+        <p:sp>
+          <p:nvSpPr>
+            <p:cNvPr id="11" name="Rectangle 10"/>
             <p:cNvSpPr/>
             <p:nvPr/>
           </p:nvSpPr>
@@ -9067,10 +11532,10 @@
         </p:nvGrpSpPr>
         <p:grpSpPr>
           <a:xfrm>
-            <a:off x="0" y="6629400"/>
-            <a:ext cx="12191999" cy="228600"/>
-            <a:chOff x="0" y="6629400"/>
-            <a:chExt cx="12191999" cy="228600"/>
+            <a:off x="0" y="6400800"/>
+            <a:ext cx="12191999" cy="457200"/>
+            <a:chOff x="0" y="6400800"/>
+            <a:chExt cx="12191999" cy="457200"/>
           </a:xfrm>
         </p:grpSpPr>
         <p:sp>
@@ -9118,7 +11583,35 @@
         </p:sp>
         <p:sp>
           <p:nvSpPr>
-            <p:cNvPr id="6" name="Rectangle 5"/>
+            <p:cNvPr id="6" name="TextBox 5"/>
+            <p:cNvSpPr txBox="1"/>
+            <p:nvPr/>
+          </p:nvSpPr>
+          <p:spPr>
+            <a:xfrm>
+              <a:off x="0" y="6400800"/>
+              <a:ext cx="1108363" cy="228600"/>
+            </a:xfrm>
+            <a:prstGeom prst="rect">
+              <a:avLst/>
+            </a:prstGeom>
+            <a:noFill/>
+          </p:spPr>
+          <p:txBody>
+            <a:bodyPr wrap="none">
+              <a:spAutoFit/>
+            </a:bodyPr>
+            <a:lstStyle/>
+            <a:p>
+              <a:pPr>
+                <a:defRPr sz="1200"/>
+              </a:pPr>
+            </a:p>
+          </p:txBody>
+        </p:sp>
+        <p:sp>
+          <p:nvSpPr>
+            <p:cNvPr id="7" name="Rectangle 6"/>
             <p:cNvSpPr/>
             <p:nvPr/>
           </p:nvSpPr>
@@ -9161,7 +11654,38 @@
         </p:sp>
         <p:sp>
           <p:nvSpPr>
-            <p:cNvPr id="7" name="Rectangle 6"/>
+            <p:cNvPr id="8" name="TextBox 7"/>
+            <p:cNvSpPr txBox="1"/>
+            <p:nvPr/>
+          </p:nvSpPr>
+          <p:spPr>
+            <a:xfrm>
+              <a:off x="1108363" y="6400800"/>
+              <a:ext cx="1662545" cy="228600"/>
+            </a:xfrm>
+            <a:prstGeom prst="rect">
+              <a:avLst/>
+            </a:prstGeom>
+            <a:noFill/>
+          </p:spPr>
+          <p:txBody>
+            <a:bodyPr wrap="none">
+              <a:spAutoFit/>
+            </a:bodyPr>
+            <a:lstStyle/>
+            <a:p>
+              <a:pPr>
+                <a:defRPr sz="1200"/>
+              </a:pPr>
+              <a:r>
+                <a:t>chapter1</a:t>
+              </a:r>
+            </a:p>
+          </p:txBody>
+        </p:sp>
+        <p:sp>
+          <p:nvSpPr>
+            <p:cNvPr id="9" name="Rectangle 8"/>
             <p:cNvSpPr/>
             <p:nvPr/>
           </p:nvSpPr>
@@ -9204,7 +11728,38 @@
         </p:sp>
         <p:sp>
           <p:nvSpPr>
-            <p:cNvPr id="8" name="Rectangle 7"/>
+            <p:cNvPr id="10" name="TextBox 9"/>
+            <p:cNvSpPr txBox="1"/>
+            <p:nvPr/>
+          </p:nvSpPr>
+          <p:spPr>
+            <a:xfrm>
+              <a:off x="2770909" y="6400800"/>
+              <a:ext cx="1662545" cy="228600"/>
+            </a:xfrm>
+            <a:prstGeom prst="rect">
+              <a:avLst/>
+            </a:prstGeom>
+            <a:noFill/>
+          </p:spPr>
+          <p:txBody>
+            <a:bodyPr wrap="none">
+              <a:spAutoFit/>
+            </a:bodyPr>
+            <a:lstStyle/>
+            <a:p>
+              <a:pPr>
+                <a:defRPr sz="1200"/>
+              </a:pPr>
+              <a:r>
+                <a:t>chapter2</a:t>
+              </a:r>
+            </a:p>
+          </p:txBody>
+        </p:sp>
+        <p:sp>
+          <p:nvSpPr>
+            <p:cNvPr id="11" name="Rectangle 10"/>
             <p:cNvSpPr/>
             <p:nvPr/>
           </p:nvSpPr>
@@ -9322,10 +11877,10 @@
         </p:nvGrpSpPr>
         <p:grpSpPr>
           <a:xfrm>
-            <a:off x="0" y="6629400"/>
-            <a:ext cx="12191999" cy="228600"/>
-            <a:chOff x="0" y="6629400"/>
-            <a:chExt cx="12191999" cy="228600"/>
+            <a:off x="0" y="6400800"/>
+            <a:ext cx="12191999" cy="457200"/>
+            <a:chOff x="0" y="6400800"/>
+            <a:chExt cx="12191999" cy="457200"/>
           </a:xfrm>
         </p:grpSpPr>
         <p:sp>
@@ -9373,7 +11928,35 @@
         </p:sp>
         <p:sp>
           <p:nvSpPr>
-            <p:cNvPr id="6" name="Rectangle 5"/>
+            <p:cNvPr id="6" name="TextBox 5"/>
+            <p:cNvSpPr txBox="1"/>
+            <p:nvPr/>
+          </p:nvSpPr>
+          <p:spPr>
+            <a:xfrm>
+              <a:off x="0" y="6400800"/>
+              <a:ext cx="1108363" cy="228600"/>
+            </a:xfrm>
+            <a:prstGeom prst="rect">
+              <a:avLst/>
+            </a:prstGeom>
+            <a:noFill/>
+          </p:spPr>
+          <p:txBody>
+            <a:bodyPr wrap="none">
+              <a:spAutoFit/>
+            </a:bodyPr>
+            <a:lstStyle/>
+            <a:p>
+              <a:pPr>
+                <a:defRPr sz="1200"/>
+              </a:pPr>
+            </a:p>
+          </p:txBody>
+        </p:sp>
+        <p:sp>
+          <p:nvSpPr>
+            <p:cNvPr id="7" name="Rectangle 6"/>
             <p:cNvSpPr/>
             <p:nvPr/>
           </p:nvSpPr>
@@ -9416,7 +11999,38 @@
         </p:sp>
         <p:sp>
           <p:nvSpPr>
-            <p:cNvPr id="7" name="Rectangle 6"/>
+            <p:cNvPr id="8" name="TextBox 7"/>
+            <p:cNvSpPr txBox="1"/>
+            <p:nvPr/>
+          </p:nvSpPr>
+          <p:spPr>
+            <a:xfrm>
+              <a:off x="1108363" y="6400800"/>
+              <a:ext cx="1662545" cy="228600"/>
+            </a:xfrm>
+            <a:prstGeom prst="rect">
+              <a:avLst/>
+            </a:prstGeom>
+            <a:noFill/>
+          </p:spPr>
+          <p:txBody>
+            <a:bodyPr wrap="none">
+              <a:spAutoFit/>
+            </a:bodyPr>
+            <a:lstStyle/>
+            <a:p>
+              <a:pPr>
+                <a:defRPr sz="1200"/>
+              </a:pPr>
+              <a:r>
+                <a:t>chapter1</a:t>
+              </a:r>
+            </a:p>
+          </p:txBody>
+        </p:sp>
+        <p:sp>
+          <p:nvSpPr>
+            <p:cNvPr id="9" name="Rectangle 8"/>
             <p:cNvSpPr/>
             <p:nvPr/>
           </p:nvSpPr>
@@ -9459,7 +12073,38 @@
         </p:sp>
         <p:sp>
           <p:nvSpPr>
-            <p:cNvPr id="8" name="Rectangle 7"/>
+            <p:cNvPr id="10" name="TextBox 9"/>
+            <p:cNvSpPr txBox="1"/>
+            <p:nvPr/>
+          </p:nvSpPr>
+          <p:spPr>
+            <a:xfrm>
+              <a:off x="2770909" y="6400800"/>
+              <a:ext cx="2216727" cy="228600"/>
+            </a:xfrm>
+            <a:prstGeom prst="rect">
+              <a:avLst/>
+            </a:prstGeom>
+            <a:noFill/>
+          </p:spPr>
+          <p:txBody>
+            <a:bodyPr wrap="none">
+              <a:spAutoFit/>
+            </a:bodyPr>
+            <a:lstStyle/>
+            <a:p>
+              <a:pPr>
+                <a:defRPr sz="1200"/>
+              </a:pPr>
+              <a:r>
+                <a:t>chapter2</a:t>
+              </a:r>
+            </a:p>
+          </p:txBody>
+        </p:sp>
+        <p:sp>
+          <p:nvSpPr>
+            <p:cNvPr id="11" name="Rectangle 10"/>
             <p:cNvSpPr/>
             <p:nvPr/>
           </p:nvSpPr>

</xml_diff>